<commit_message>
the end is near ...
</commit_message>
<xml_diff>
--- a/Ruby_preparation_exam.pptx
+++ b/Ruby_preparation_exam.pptx
@@ -14,100 +14,101 @@
     <p:sldId id="379" r:id="rId8"/>
     <p:sldId id="380" r:id="rId9"/>
     <p:sldId id="381" r:id="rId10"/>
-    <p:sldId id="256" r:id="rId11"/>
-    <p:sldId id="257" r:id="rId12"/>
-    <p:sldId id="258" r:id="rId13"/>
-    <p:sldId id="259" r:id="rId14"/>
-    <p:sldId id="260" r:id="rId15"/>
-    <p:sldId id="261" r:id="rId16"/>
-    <p:sldId id="262" r:id="rId17"/>
-    <p:sldId id="263" r:id="rId18"/>
-    <p:sldId id="264" r:id="rId19"/>
-    <p:sldId id="266" r:id="rId20"/>
-    <p:sldId id="267" r:id="rId21"/>
-    <p:sldId id="269" r:id="rId22"/>
-    <p:sldId id="270" r:id="rId23"/>
-    <p:sldId id="273" r:id="rId24"/>
-    <p:sldId id="274" r:id="rId25"/>
-    <p:sldId id="275" r:id="rId26"/>
-    <p:sldId id="276" r:id="rId27"/>
-    <p:sldId id="277" r:id="rId28"/>
-    <p:sldId id="279" r:id="rId29"/>
-    <p:sldId id="280" r:id="rId30"/>
-    <p:sldId id="281" r:id="rId31"/>
-    <p:sldId id="282" r:id="rId32"/>
-    <p:sldId id="283" r:id="rId33"/>
-    <p:sldId id="284" r:id="rId34"/>
-    <p:sldId id="285" r:id="rId35"/>
-    <p:sldId id="286" r:id="rId36"/>
-    <p:sldId id="288" r:id="rId37"/>
-    <p:sldId id="289" r:id="rId38"/>
-    <p:sldId id="290" r:id="rId39"/>
-    <p:sldId id="291" r:id="rId40"/>
-    <p:sldId id="292" r:id="rId41"/>
-    <p:sldId id="293" r:id="rId42"/>
-    <p:sldId id="294" r:id="rId43"/>
-    <p:sldId id="295" r:id="rId44"/>
-    <p:sldId id="296" r:id="rId45"/>
-    <p:sldId id="297" r:id="rId46"/>
-    <p:sldId id="298" r:id="rId47"/>
-    <p:sldId id="299" r:id="rId48"/>
-    <p:sldId id="300" r:id="rId49"/>
-    <p:sldId id="301" r:id="rId50"/>
-    <p:sldId id="304" r:id="rId51"/>
-    <p:sldId id="305" r:id="rId52"/>
-    <p:sldId id="306" r:id="rId53"/>
-    <p:sldId id="307" r:id="rId54"/>
-    <p:sldId id="309" r:id="rId55"/>
-    <p:sldId id="310" r:id="rId56"/>
-    <p:sldId id="311" r:id="rId57"/>
-    <p:sldId id="312" r:id="rId58"/>
-    <p:sldId id="313" r:id="rId59"/>
-    <p:sldId id="316" r:id="rId60"/>
-    <p:sldId id="318" r:id="rId61"/>
-    <p:sldId id="320" r:id="rId62"/>
-    <p:sldId id="324" r:id="rId63"/>
-    <p:sldId id="325" r:id="rId64"/>
-    <p:sldId id="326" r:id="rId65"/>
-    <p:sldId id="327" r:id="rId66"/>
-    <p:sldId id="331" r:id="rId67"/>
-    <p:sldId id="332" r:id="rId68"/>
-    <p:sldId id="333" r:id="rId69"/>
-    <p:sldId id="334" r:id="rId70"/>
-    <p:sldId id="339" r:id="rId71"/>
-    <p:sldId id="340" r:id="rId72"/>
-    <p:sldId id="341" r:id="rId73"/>
-    <p:sldId id="342" r:id="rId74"/>
-    <p:sldId id="343" r:id="rId75"/>
-    <p:sldId id="344" r:id="rId76"/>
-    <p:sldId id="345" r:id="rId77"/>
-    <p:sldId id="346" r:id="rId78"/>
-    <p:sldId id="347" r:id="rId79"/>
-    <p:sldId id="348" r:id="rId80"/>
-    <p:sldId id="349" r:id="rId81"/>
-    <p:sldId id="350" r:id="rId82"/>
-    <p:sldId id="351" r:id="rId83"/>
-    <p:sldId id="352" r:id="rId84"/>
-    <p:sldId id="354" r:id="rId85"/>
-    <p:sldId id="355" r:id="rId86"/>
-    <p:sldId id="356" r:id="rId87"/>
-    <p:sldId id="357" r:id="rId88"/>
-    <p:sldId id="358" r:id="rId89"/>
-    <p:sldId id="359" r:id="rId90"/>
-    <p:sldId id="360" r:id="rId91"/>
-    <p:sldId id="361" r:id="rId92"/>
-    <p:sldId id="363" r:id="rId93"/>
-    <p:sldId id="364" r:id="rId94"/>
-    <p:sldId id="365" r:id="rId95"/>
-    <p:sldId id="366" r:id="rId96"/>
-    <p:sldId id="367" r:id="rId97"/>
-    <p:sldId id="369" r:id="rId98"/>
-    <p:sldId id="371" r:id="rId99"/>
-    <p:sldId id="372" r:id="rId100"/>
-    <p:sldId id="373" r:id="rId101"/>
-    <p:sldId id="374" r:id="rId102"/>
-    <p:sldId id="375" r:id="rId103"/>
-    <p:sldId id="382" r:id="rId104"/>
+    <p:sldId id="383" r:id="rId11"/>
+    <p:sldId id="256" r:id="rId12"/>
+    <p:sldId id="257" r:id="rId13"/>
+    <p:sldId id="258" r:id="rId14"/>
+    <p:sldId id="259" r:id="rId15"/>
+    <p:sldId id="260" r:id="rId16"/>
+    <p:sldId id="261" r:id="rId17"/>
+    <p:sldId id="262" r:id="rId18"/>
+    <p:sldId id="263" r:id="rId19"/>
+    <p:sldId id="264" r:id="rId20"/>
+    <p:sldId id="266" r:id="rId21"/>
+    <p:sldId id="267" r:id="rId22"/>
+    <p:sldId id="269" r:id="rId23"/>
+    <p:sldId id="270" r:id="rId24"/>
+    <p:sldId id="273" r:id="rId25"/>
+    <p:sldId id="274" r:id="rId26"/>
+    <p:sldId id="275" r:id="rId27"/>
+    <p:sldId id="276" r:id="rId28"/>
+    <p:sldId id="277" r:id="rId29"/>
+    <p:sldId id="279" r:id="rId30"/>
+    <p:sldId id="280" r:id="rId31"/>
+    <p:sldId id="281" r:id="rId32"/>
+    <p:sldId id="282" r:id="rId33"/>
+    <p:sldId id="283" r:id="rId34"/>
+    <p:sldId id="284" r:id="rId35"/>
+    <p:sldId id="285" r:id="rId36"/>
+    <p:sldId id="286" r:id="rId37"/>
+    <p:sldId id="288" r:id="rId38"/>
+    <p:sldId id="289" r:id="rId39"/>
+    <p:sldId id="290" r:id="rId40"/>
+    <p:sldId id="291" r:id="rId41"/>
+    <p:sldId id="292" r:id="rId42"/>
+    <p:sldId id="293" r:id="rId43"/>
+    <p:sldId id="294" r:id="rId44"/>
+    <p:sldId id="295" r:id="rId45"/>
+    <p:sldId id="296" r:id="rId46"/>
+    <p:sldId id="297" r:id="rId47"/>
+    <p:sldId id="298" r:id="rId48"/>
+    <p:sldId id="299" r:id="rId49"/>
+    <p:sldId id="300" r:id="rId50"/>
+    <p:sldId id="301" r:id="rId51"/>
+    <p:sldId id="304" r:id="rId52"/>
+    <p:sldId id="305" r:id="rId53"/>
+    <p:sldId id="306" r:id="rId54"/>
+    <p:sldId id="307" r:id="rId55"/>
+    <p:sldId id="309" r:id="rId56"/>
+    <p:sldId id="310" r:id="rId57"/>
+    <p:sldId id="311" r:id="rId58"/>
+    <p:sldId id="312" r:id="rId59"/>
+    <p:sldId id="313" r:id="rId60"/>
+    <p:sldId id="316" r:id="rId61"/>
+    <p:sldId id="318" r:id="rId62"/>
+    <p:sldId id="320" r:id="rId63"/>
+    <p:sldId id="324" r:id="rId64"/>
+    <p:sldId id="325" r:id="rId65"/>
+    <p:sldId id="326" r:id="rId66"/>
+    <p:sldId id="327" r:id="rId67"/>
+    <p:sldId id="331" r:id="rId68"/>
+    <p:sldId id="332" r:id="rId69"/>
+    <p:sldId id="333" r:id="rId70"/>
+    <p:sldId id="334" r:id="rId71"/>
+    <p:sldId id="339" r:id="rId72"/>
+    <p:sldId id="340" r:id="rId73"/>
+    <p:sldId id="341" r:id="rId74"/>
+    <p:sldId id="342" r:id="rId75"/>
+    <p:sldId id="343" r:id="rId76"/>
+    <p:sldId id="344" r:id="rId77"/>
+    <p:sldId id="345" r:id="rId78"/>
+    <p:sldId id="346" r:id="rId79"/>
+    <p:sldId id="347" r:id="rId80"/>
+    <p:sldId id="348" r:id="rId81"/>
+    <p:sldId id="349" r:id="rId82"/>
+    <p:sldId id="350" r:id="rId83"/>
+    <p:sldId id="351" r:id="rId84"/>
+    <p:sldId id="352" r:id="rId85"/>
+    <p:sldId id="354" r:id="rId86"/>
+    <p:sldId id="355" r:id="rId87"/>
+    <p:sldId id="356" r:id="rId88"/>
+    <p:sldId id="357" r:id="rId89"/>
+    <p:sldId id="358" r:id="rId90"/>
+    <p:sldId id="359" r:id="rId91"/>
+    <p:sldId id="360" r:id="rId92"/>
+    <p:sldId id="361" r:id="rId93"/>
+    <p:sldId id="363" r:id="rId94"/>
+    <p:sldId id="364" r:id="rId95"/>
+    <p:sldId id="365" r:id="rId96"/>
+    <p:sldId id="366" r:id="rId97"/>
+    <p:sldId id="367" r:id="rId98"/>
+    <p:sldId id="369" r:id="rId99"/>
+    <p:sldId id="371" r:id="rId100"/>
+    <p:sldId id="372" r:id="rId101"/>
+    <p:sldId id="373" r:id="rId102"/>
+    <p:sldId id="374" r:id="rId103"/>
+    <p:sldId id="375" r:id="rId104"/>
+    <p:sldId id="382" r:id="rId105"/>
   </p:sldIdLst>
   <p:sldSz cx="9144000" cy="6858000" type="screen4x3"/>
   <p:notesSz cx="6858000" cy="9144000"/>
@@ -390,7 +391,7 @@
           <a:p>
             <a:fld id="{6EFDFA74-11A0-DC40-9EFC-96B39A6FFFB7}" type="datetimeFigureOut">
               <a:rPr lang="en-US" smtClean="0"/>
-              <a:t>11/7/13</a:t>
+              <a:t>11/11/13</a:t>
             </a:fld>
             <a:endParaRPr lang="en-US"/>
           </a:p>
@@ -560,7 +561,7 @@
           <a:p>
             <a:fld id="{6EFDFA74-11A0-DC40-9EFC-96B39A6FFFB7}" type="datetimeFigureOut">
               <a:rPr lang="en-US" smtClean="0"/>
-              <a:t>11/7/13</a:t>
+              <a:t>11/11/13</a:t>
             </a:fld>
             <a:endParaRPr lang="en-US"/>
           </a:p>
@@ -740,7 +741,7 @@
           <a:p>
             <a:fld id="{6EFDFA74-11A0-DC40-9EFC-96B39A6FFFB7}" type="datetimeFigureOut">
               <a:rPr lang="en-US" smtClean="0"/>
-              <a:t>11/7/13</a:t>
+              <a:t>11/11/13</a:t>
             </a:fld>
             <a:endParaRPr lang="en-US"/>
           </a:p>
@@ -910,7 +911,7 @@
           <a:p>
             <a:fld id="{6EFDFA74-11A0-DC40-9EFC-96B39A6FFFB7}" type="datetimeFigureOut">
               <a:rPr lang="en-US" smtClean="0"/>
-              <a:t>11/7/13</a:t>
+              <a:t>11/11/13</a:t>
             </a:fld>
             <a:endParaRPr lang="en-US"/>
           </a:p>
@@ -1156,7 +1157,7 @@
           <a:p>
             <a:fld id="{6EFDFA74-11A0-DC40-9EFC-96B39A6FFFB7}" type="datetimeFigureOut">
               <a:rPr lang="en-US" smtClean="0"/>
-              <a:t>11/7/13</a:t>
+              <a:t>11/11/13</a:t>
             </a:fld>
             <a:endParaRPr lang="en-US"/>
           </a:p>
@@ -1444,7 +1445,7 @@
           <a:p>
             <a:fld id="{6EFDFA74-11A0-DC40-9EFC-96B39A6FFFB7}" type="datetimeFigureOut">
               <a:rPr lang="en-US" smtClean="0"/>
-              <a:t>11/7/13</a:t>
+              <a:t>11/11/13</a:t>
             </a:fld>
             <a:endParaRPr lang="en-US"/>
           </a:p>
@@ -1866,7 +1867,7 @@
           <a:p>
             <a:fld id="{6EFDFA74-11A0-DC40-9EFC-96B39A6FFFB7}" type="datetimeFigureOut">
               <a:rPr lang="en-US" smtClean="0"/>
-              <a:t>11/7/13</a:t>
+              <a:t>11/11/13</a:t>
             </a:fld>
             <a:endParaRPr lang="en-US"/>
           </a:p>
@@ -1984,7 +1985,7 @@
           <a:p>
             <a:fld id="{6EFDFA74-11A0-DC40-9EFC-96B39A6FFFB7}" type="datetimeFigureOut">
               <a:rPr lang="en-US" smtClean="0"/>
-              <a:t>11/7/13</a:t>
+              <a:t>11/11/13</a:t>
             </a:fld>
             <a:endParaRPr lang="en-US"/>
           </a:p>
@@ -2079,7 +2080,7 @@
           <a:p>
             <a:fld id="{6EFDFA74-11A0-DC40-9EFC-96B39A6FFFB7}" type="datetimeFigureOut">
               <a:rPr lang="en-US" smtClean="0"/>
-              <a:t>11/7/13</a:t>
+              <a:t>11/11/13</a:t>
             </a:fld>
             <a:endParaRPr lang="en-US"/>
           </a:p>
@@ -2356,7 +2357,7 @@
           <a:p>
             <a:fld id="{6EFDFA74-11A0-DC40-9EFC-96B39A6FFFB7}" type="datetimeFigureOut">
               <a:rPr lang="en-US" smtClean="0"/>
-              <a:t>11/7/13</a:t>
+              <a:t>11/11/13</a:t>
             </a:fld>
             <a:endParaRPr lang="en-US"/>
           </a:p>
@@ -2609,7 +2610,7 @@
           <a:p>
             <a:fld id="{6EFDFA74-11A0-DC40-9EFC-96B39A6FFFB7}" type="datetimeFigureOut">
               <a:rPr lang="en-US" smtClean="0"/>
-              <a:t>11/7/13</a:t>
+              <a:t>11/11/13</a:t>
             </a:fld>
             <a:endParaRPr lang="en-US"/>
           </a:p>
@@ -2822,7 +2823,7 @@
           <a:p>
             <a:fld id="{6EFDFA74-11A0-DC40-9EFC-96B39A6FFFB7}" type="datetimeFigureOut">
               <a:rPr lang="en-US" smtClean="0"/>
-              <a:t>11/7/13</a:t>
+              <a:t>11/11/13</a:t>
             </a:fld>
             <a:endParaRPr lang="en-US"/>
           </a:p>
@@ -3216,15 +3217,7 @@
           <a:p>
             <a:r>
               <a:rPr lang="en-US" dirty="0" smtClean="0"/>
-              <a:t>Ruby 1.8.7 </a:t>
-            </a:r>
-            <a:r>
-              <a:rPr lang="en-US" dirty="0" smtClean="0"/>
-              <a:t>Certification Preparation</a:t>
-            </a:r>
-            <a:r>
-              <a:rPr lang="en-US" dirty="0" smtClean="0"/>
-              <a:t/>
+              <a:t>Ruby 1.8.7 Certification Preparation</a:t>
             </a:r>
             <a:br>
               <a:rPr lang="en-US" dirty="0" smtClean="0"/>
@@ -3250,13 +3243,8 @@
           <a:p>
             <a:r>
               <a:rPr lang="en-US" dirty="0" smtClean="0"/>
-              <a:t>By Sir Flavio, the </a:t>
-            </a:r>
-            <a:r>
-              <a:rPr lang="en-US" dirty="0" smtClean="0"/>
-              <a:t>Vit</a:t>
-            </a:r>
-            <a:endParaRPr lang="en-US" dirty="0" smtClean="0"/>
+              <a:t>By Sir Flavio, the Vit</a:t>
+            </a:r>
           </a:p>
         </p:txBody>
       </p:sp>
@@ -3297,9 +3285,32 @@
           <a:chExt cx="0" cy="0"/>
         </a:xfrm>
       </p:grpSpPr>
+      <p:sp>
+        <p:nvSpPr>
+          <p:cNvPr id="2" name="Title 1"/>
+          <p:cNvSpPr>
+            <a:spLocks noGrp="1"/>
+          </p:cNvSpPr>
+          <p:nvPr>
+            <p:ph type="title"/>
+          </p:nvPr>
+        </p:nvSpPr>
+        <p:spPr/>
+        <p:txBody>
+          <a:bodyPr/>
+          <a:lstStyle/>
+          <a:p>
+            <a:r>
+              <a:rPr lang="en-US" dirty="0" smtClean="0"/>
+              <a:t>File Reading Tricks</a:t>
+            </a:r>
+            <a:endParaRPr lang="en-US" dirty="0"/>
+          </a:p>
+        </p:txBody>
+      </p:sp>
       <p:pic>
         <p:nvPicPr>
-          <p:cNvPr id="6" name="Picture 5"/>
+          <p:cNvPr id="5" name="Picture 4"/>
           <p:cNvPicPr>
             <a:picLocks noChangeAspect="1"/>
           </p:cNvPicPr>
@@ -3313,69 +3324,24 @@
         </p:blipFill>
         <p:spPr>
           <a:xfrm>
-            <a:off x="148166" y="221916"/>
-            <a:ext cx="8986629" cy="4505306"/>
+            <a:off x="0" y="1689100"/>
+            <a:ext cx="9144000" cy="3462889"/>
           </a:xfrm>
           <a:prstGeom prst="rect">
             <a:avLst/>
           </a:prstGeom>
         </p:spPr>
       </p:pic>
-      <p:sp>
-        <p:nvSpPr>
-          <p:cNvPr id="3" name="6-Point Star 2"/>
-          <p:cNvSpPr/>
-          <p:nvPr/>
-        </p:nvSpPr>
-        <p:spPr>
-          <a:xfrm>
-            <a:off x="1435706" y="3389058"/>
-            <a:ext cx="276098" cy="334559"/>
-          </a:xfrm>
-          <a:prstGeom prst="star6">
-            <a:avLst/>
-          </a:prstGeom>
-        </p:spPr>
-        <p:style>
-          <a:lnRef idx="1">
-            <a:schemeClr val="accent1"/>
-          </a:lnRef>
-          <a:fillRef idx="3">
-            <a:schemeClr val="accent1"/>
-          </a:fillRef>
-          <a:effectRef idx="2">
-            <a:schemeClr val="accent1"/>
-          </a:effectRef>
-          <a:fontRef idx="minor">
-            <a:schemeClr val="lt1"/>
-          </a:fontRef>
-        </p:style>
-        <p:txBody>
-          <a:bodyPr rtlCol="0" anchor="ctr"/>
-          <a:lstStyle/>
-          <a:p>
-            <a:pPr algn="ctr"/>
-            <a:endParaRPr lang="en-US"/>
-          </a:p>
-        </p:txBody>
-      </p:sp>
     </p:spTree>
     <p:extLst>
       <p:ext uri="{BB962C8B-B14F-4D97-AF65-F5344CB8AC3E}">
-        <p14:creationId xmlns:p14="http://schemas.microsoft.com/office/powerpoint/2010/main" val="2588950825"/>
+        <p14:creationId xmlns:p14="http://schemas.microsoft.com/office/powerpoint/2010/main" val="1777188495"/>
       </p:ext>
     </p:extLst>
   </p:cSld>
   <p:clrMapOvr>
     <a:masterClrMapping/>
   </p:clrMapOvr>
-  <p:timing>
-    <p:tnLst>
-      <p:par>
-        <p:cTn xmlns:p14="http://schemas.microsoft.com/office/powerpoint/2010/main" id="1" dur="indefinite" restart="never" nodeType="tmRoot"/>
-      </p:par>
-    </p:tnLst>
-  </p:timing>
 </p:sld>
 </file>
 
@@ -3412,8 +3378,8 @@
         </p:blipFill>
         <p:spPr>
           <a:xfrm>
-            <a:off x="1930400" y="38100"/>
-            <a:ext cx="5270500" cy="6781800"/>
+            <a:off x="1636889" y="105638"/>
+            <a:ext cx="5132211" cy="5812562"/>
           </a:xfrm>
           <a:prstGeom prst="rect">
             <a:avLst/>
@@ -3423,7 +3389,7 @@
     </p:spTree>
     <p:extLst>
       <p:ext uri="{BB962C8B-B14F-4D97-AF65-F5344CB8AC3E}">
-        <p14:creationId xmlns:p14="http://schemas.microsoft.com/office/powerpoint/2010/main" val="2215606598"/>
+        <p14:creationId xmlns:p14="http://schemas.microsoft.com/office/powerpoint/2010/main" val="41950219"/>
       </p:ext>
     </p:extLst>
   </p:cSld>
@@ -3466,8 +3432,8 @@
         </p:blipFill>
         <p:spPr>
           <a:xfrm>
-            <a:off x="2171700" y="0"/>
-            <a:ext cx="4799360" cy="6858000"/>
+            <a:off x="1930400" y="38100"/>
+            <a:ext cx="5270500" cy="6781800"/>
           </a:xfrm>
           <a:prstGeom prst="rect">
             <a:avLst/>
@@ -3477,7 +3443,7 @@
     </p:spTree>
     <p:extLst>
       <p:ext uri="{BB962C8B-B14F-4D97-AF65-F5344CB8AC3E}">
-        <p14:creationId xmlns:p14="http://schemas.microsoft.com/office/powerpoint/2010/main" val="4089452289"/>
+        <p14:creationId xmlns:p14="http://schemas.microsoft.com/office/powerpoint/2010/main" val="2215606598"/>
       </p:ext>
     </p:extLst>
   </p:cSld>
@@ -3520,6 +3486,60 @@
         </p:blipFill>
         <p:spPr>
           <a:xfrm>
+            <a:off x="2171700" y="0"/>
+            <a:ext cx="4799360" cy="6858000"/>
+          </a:xfrm>
+          <a:prstGeom prst="rect">
+            <a:avLst/>
+          </a:prstGeom>
+        </p:spPr>
+      </p:pic>
+    </p:spTree>
+    <p:extLst>
+      <p:ext uri="{BB962C8B-B14F-4D97-AF65-F5344CB8AC3E}">
+        <p14:creationId xmlns:p14="http://schemas.microsoft.com/office/powerpoint/2010/main" val="4089452289"/>
+      </p:ext>
+    </p:extLst>
+  </p:cSld>
+  <p:clrMapOvr>
+    <a:masterClrMapping/>
+  </p:clrMapOvr>
+</p:sld>
+</file>
+
+<file path=ppt/slides/slide103.xml><?xml version="1.0" encoding="utf-8"?>
+<p:sld xmlns:a="http://schemas.openxmlformats.org/drawingml/2006/main" xmlns:r="http://schemas.openxmlformats.org/officeDocument/2006/relationships" xmlns:p="http://schemas.openxmlformats.org/presentationml/2006/main">
+  <p:cSld>
+    <p:spTree>
+      <p:nvGrpSpPr>
+        <p:cNvPr id="1" name=""/>
+        <p:cNvGrpSpPr/>
+        <p:nvPr/>
+      </p:nvGrpSpPr>
+      <p:grpSpPr>
+        <a:xfrm>
+          <a:off x="0" y="0"/>
+          <a:ext cx="0" cy="0"/>
+          <a:chOff x="0" y="0"/>
+          <a:chExt cx="0" cy="0"/>
+        </a:xfrm>
+      </p:grpSpPr>
+      <p:pic>
+        <p:nvPicPr>
+          <p:cNvPr id="2" name="Picture 1"/>
+          <p:cNvPicPr>
+            <a:picLocks noChangeAspect="1"/>
+          </p:cNvPicPr>
+          <p:nvPr/>
+        </p:nvPicPr>
+        <p:blipFill>
+          <a:blip r:embed="rId2"/>
+          <a:stretch>
+            <a:fillRect/>
+          </a:stretch>
+        </p:blipFill>
+        <p:spPr>
+          <a:xfrm>
             <a:off x="2006600" y="0"/>
             <a:ext cx="5112327" cy="6858000"/>
           </a:xfrm>
@@ -3541,7 +3561,7 @@
 </p:sld>
 </file>
 
-<file path=ppt/slides/slide103.xml><?xml version="1.0" encoding="utf-8"?>
+<file path=ppt/slides/slide104.xml><?xml version="1.0" encoding="utf-8"?>
 <p:sld xmlns:a="http://schemas.openxmlformats.org/drawingml/2006/main" xmlns:r="http://schemas.openxmlformats.org/officeDocument/2006/relationships" xmlns:p="http://schemas.openxmlformats.org/presentationml/2006/main">
   <p:cSld>
     <p:spTree>
@@ -3614,7 +3634,7 @@
       </p:grpSpPr>
       <p:pic>
         <p:nvPicPr>
-          <p:cNvPr id="4" name="Picture 3"/>
+          <p:cNvPr id="6" name="Picture 5"/>
           <p:cNvPicPr>
             <a:picLocks noChangeAspect="1"/>
           </p:cNvPicPr>
@@ -3628,8 +3648,8 @@
         </p:blipFill>
         <p:spPr>
           <a:xfrm>
-            <a:off x="487554" y="564770"/>
-            <a:ext cx="7327900" cy="3644900"/>
+            <a:off x="148166" y="221916"/>
+            <a:ext cx="8986629" cy="4505306"/>
           </a:xfrm>
           <a:prstGeom prst="rect">
             <a:avLst/>
@@ -3638,43 +3658,13 @@
       </p:pic>
       <p:sp>
         <p:nvSpPr>
-          <p:cNvPr id="2" name="TextBox 1"/>
-          <p:cNvSpPr txBox="1"/>
-          <p:nvPr/>
-        </p:nvSpPr>
-        <p:spPr>
-          <a:xfrm>
-            <a:off x="1122112" y="5124261"/>
-            <a:ext cx="6520723" cy="369332"/>
-          </a:xfrm>
-          <a:prstGeom prst="rect">
-            <a:avLst/>
-          </a:prstGeom>
-          <a:noFill/>
-        </p:spPr>
-        <p:txBody>
-          <a:bodyPr wrap="none" rtlCol="0">
-            <a:spAutoFit/>
-          </a:bodyPr>
-          <a:lstStyle/>
-          <a:p>
-            <a:r>
-              <a:rPr lang="en-US" dirty="0" smtClean="0"/>
-              <a:t>Answer: Identical … Symbol objects with same string are identical.</a:t>
-            </a:r>
-            <a:endParaRPr lang="en-US" dirty="0"/>
-          </a:p>
-        </p:txBody>
-      </p:sp>
-      <p:sp>
-        <p:nvSpPr>
-          <p:cNvPr id="5" name="6-Point Star 4"/>
+          <p:cNvPr id="3" name="6-Point Star 2"/>
           <p:cNvSpPr/>
           <p:nvPr/>
         </p:nvSpPr>
         <p:spPr>
           <a:xfrm>
-            <a:off x="1573755" y="2610893"/>
+            <a:off x="1435706" y="3389058"/>
             <a:ext cx="276098" cy="334559"/>
           </a:xfrm>
           <a:prstGeom prst="star6">
@@ -3707,7 +3697,7 @@
     </p:spTree>
     <p:extLst>
       <p:ext uri="{BB962C8B-B14F-4D97-AF65-F5344CB8AC3E}">
-        <p14:creationId xmlns:p14="http://schemas.microsoft.com/office/powerpoint/2010/main" val="2244118771"/>
+        <p14:creationId xmlns:p14="http://schemas.microsoft.com/office/powerpoint/2010/main" val="2588950825"/>
       </p:ext>
     </p:extLst>
   </p:cSld>
@@ -3743,7 +3733,7 @@
       </p:grpSpPr>
       <p:pic>
         <p:nvPicPr>
-          <p:cNvPr id="2" name="Picture 1"/>
+          <p:cNvPr id="4" name="Picture 3"/>
           <p:cNvPicPr>
             <a:picLocks noChangeAspect="1"/>
           </p:cNvPicPr>
@@ -3757,8 +3747,8 @@
         </p:blipFill>
         <p:spPr>
           <a:xfrm>
-            <a:off x="510731" y="601764"/>
-            <a:ext cx="8434159" cy="4533970"/>
+            <a:off x="487554" y="564770"/>
+            <a:ext cx="7327900" cy="3644900"/>
           </a:xfrm>
           <a:prstGeom prst="rect">
             <a:avLst/>
@@ -3767,13 +3757,43 @@
       </p:pic>
       <p:sp>
         <p:nvSpPr>
-          <p:cNvPr id="3" name="6-Point Star 2"/>
+          <p:cNvPr id="2" name="TextBox 1"/>
+          <p:cNvSpPr txBox="1"/>
+          <p:nvPr/>
+        </p:nvSpPr>
+        <p:spPr>
+          <a:xfrm>
+            <a:off x="1122112" y="5124261"/>
+            <a:ext cx="6520723" cy="369332"/>
+          </a:xfrm>
+          <a:prstGeom prst="rect">
+            <a:avLst/>
+          </a:prstGeom>
+          <a:noFill/>
+        </p:spPr>
+        <p:txBody>
+          <a:bodyPr wrap="none" rtlCol="0">
+            <a:spAutoFit/>
+          </a:bodyPr>
+          <a:lstStyle/>
+          <a:p>
+            <a:r>
+              <a:rPr lang="en-US" dirty="0" smtClean="0"/>
+              <a:t>Answer: Identical … Symbol objects with same string are identical.</a:t>
+            </a:r>
+            <a:endParaRPr lang="en-US" dirty="0"/>
+          </a:p>
+        </p:txBody>
+      </p:sp>
+      <p:sp>
+        <p:nvSpPr>
+          <p:cNvPr id="5" name="6-Point Star 4"/>
           <p:cNvSpPr/>
           <p:nvPr/>
         </p:nvSpPr>
         <p:spPr>
           <a:xfrm>
-            <a:off x="2045546" y="3659223"/>
+            <a:off x="1573755" y="2610893"/>
             <a:ext cx="276098" cy="334559"/>
           </a:xfrm>
           <a:prstGeom prst="star6">
@@ -3806,7 +3826,7 @@
     </p:spTree>
     <p:extLst>
       <p:ext uri="{BB962C8B-B14F-4D97-AF65-F5344CB8AC3E}">
-        <p14:creationId xmlns:p14="http://schemas.microsoft.com/office/powerpoint/2010/main" val="1562014035"/>
+        <p14:creationId xmlns:p14="http://schemas.microsoft.com/office/powerpoint/2010/main" val="2244118771"/>
       </p:ext>
     </p:extLst>
   </p:cSld>
@@ -3856,8 +3876,8 @@
         </p:blipFill>
         <p:spPr>
           <a:xfrm>
-            <a:off x="-1" y="109179"/>
-            <a:ext cx="9260841" cy="4543353"/>
+            <a:off x="510731" y="601764"/>
+            <a:ext cx="8434159" cy="4533970"/>
           </a:xfrm>
           <a:prstGeom prst="rect">
             <a:avLst/>
@@ -3866,69 +3886,13 @@
       </p:pic>
       <p:sp>
         <p:nvSpPr>
-          <p:cNvPr id="3" name="TextBox 2"/>
-          <p:cNvSpPr txBox="1"/>
-          <p:nvPr/>
-        </p:nvSpPr>
-        <p:spPr>
-          <a:xfrm>
-            <a:off x="1228633" y="5618935"/>
-            <a:ext cx="7626306" cy="646331"/>
-          </a:xfrm>
-          <a:prstGeom prst="rect">
-            <a:avLst/>
-          </a:prstGeom>
-          <a:noFill/>
-        </p:spPr>
-        <p:txBody>
-          <a:bodyPr wrap="none" rtlCol="0">
-            <a:spAutoFit/>
-          </a:bodyPr>
-          <a:lstStyle/>
-          <a:p>
-            <a:r>
-              <a:rPr lang="en-US" dirty="0" smtClean="0"/>
-              <a:t>Crap … for sure it it returned a new string. Important to notice is that </a:t>
-            </a:r>
-            <a:r>
-              <a:rPr lang="en-US" dirty="0" err="1" smtClean="0"/>
-              <a:t>formbody</a:t>
-            </a:r>
-            <a:r>
-              <a:rPr lang="en-US" dirty="0" smtClean="0"/>
-              <a:t> </a:t>
-            </a:r>
-          </a:p>
-          <a:p>
-            <a:r>
-              <a:rPr lang="en-US" dirty="0" smtClean="0"/>
-              <a:t>is not changed. </a:t>
-            </a:r>
-            <a:r>
-              <a:rPr lang="en-US" dirty="0" err="1"/>
-              <a:t>g</a:t>
-            </a:r>
-            <a:r>
-              <a:rPr lang="en-US" dirty="0" err="1" smtClean="0"/>
-              <a:t>sub</a:t>
-            </a:r>
-            <a:r>
-              <a:rPr lang="en-US" dirty="0" smtClean="0"/>
-              <a:t>! In other hand will mutate the original string.</a:t>
-            </a:r>
-            <a:endParaRPr lang="en-US" dirty="0"/>
-          </a:p>
-        </p:txBody>
-      </p:sp>
-      <p:sp>
-        <p:nvSpPr>
-          <p:cNvPr id="4" name="6-Point Star 3"/>
+          <p:cNvPr id="3" name="6-Point Star 2"/>
           <p:cNvSpPr/>
           <p:nvPr/>
         </p:nvSpPr>
         <p:spPr>
           <a:xfrm>
-            <a:off x="1488523" y="2276334"/>
+            <a:off x="2045546" y="3659223"/>
             <a:ext cx="276098" cy="334559"/>
           </a:xfrm>
           <a:prstGeom prst="star6">
@@ -3961,7 +3925,7 @@
     </p:spTree>
     <p:extLst>
       <p:ext uri="{BB962C8B-B14F-4D97-AF65-F5344CB8AC3E}">
-        <p14:creationId xmlns:p14="http://schemas.microsoft.com/office/powerpoint/2010/main" val="1827377589"/>
+        <p14:creationId xmlns:p14="http://schemas.microsoft.com/office/powerpoint/2010/main" val="1562014035"/>
       </p:ext>
     </p:extLst>
   </p:cSld>
@@ -4011,8 +3975,8 @@
         </p:blipFill>
         <p:spPr>
           <a:xfrm>
-            <a:off x="160632" y="128482"/>
-            <a:ext cx="8415452" cy="4303159"/>
+            <a:off x="-1" y="109179"/>
+            <a:ext cx="9260841" cy="4543353"/>
           </a:xfrm>
           <a:prstGeom prst="rect">
             <a:avLst/>
@@ -4027,8 +3991,8 @@
         </p:nvSpPr>
         <p:spPr>
           <a:xfrm>
-            <a:off x="2498681" y="4431642"/>
-            <a:ext cx="3593164" cy="369332"/>
+            <a:off x="1228633" y="5618935"/>
+            <a:ext cx="7626306" cy="646331"/>
           </a:xfrm>
           <a:prstGeom prst="rect">
             <a:avLst/>
@@ -4043,7 +4007,33 @@
           <a:p>
             <a:r>
               <a:rPr lang="en-US" dirty="0" smtClean="0"/>
-              <a:t>While loop with a negated condition </a:t>
+              <a:t>Crap … for sure it it returned a new string. Important to notice is that </a:t>
+            </a:r>
+            <a:r>
+              <a:rPr lang="en-US" dirty="0" err="1" smtClean="0"/>
+              <a:t>formbody</a:t>
+            </a:r>
+            <a:r>
+              <a:rPr lang="en-US" dirty="0" smtClean="0"/>
+              <a:t> </a:t>
+            </a:r>
+          </a:p>
+          <a:p>
+            <a:r>
+              <a:rPr lang="en-US" dirty="0" smtClean="0"/>
+              <a:t>is not changed. </a:t>
+            </a:r>
+            <a:r>
+              <a:rPr lang="en-US" dirty="0" err="1"/>
+              <a:t>g</a:t>
+            </a:r>
+            <a:r>
+              <a:rPr lang="en-US" dirty="0" err="1" smtClean="0"/>
+              <a:t>sub</a:t>
+            </a:r>
+            <a:r>
+              <a:rPr lang="en-US" dirty="0" smtClean="0"/>
+              <a:t>! In other hand will mutate the original string.</a:t>
             </a:r>
             <a:endParaRPr lang="en-US" dirty="0"/>
           </a:p>
@@ -4057,7 +4047,7 @@
         </p:nvSpPr>
         <p:spPr>
           <a:xfrm>
-            <a:off x="1587866" y="2443614"/>
+            <a:off x="1488523" y="2276334"/>
             <a:ext cx="276098" cy="334559"/>
           </a:xfrm>
           <a:prstGeom prst="star6">
@@ -4090,7 +4080,7 @@
     </p:spTree>
     <p:extLst>
       <p:ext uri="{BB962C8B-B14F-4D97-AF65-F5344CB8AC3E}">
-        <p14:creationId xmlns:p14="http://schemas.microsoft.com/office/powerpoint/2010/main" val="531155991"/>
+        <p14:creationId xmlns:p14="http://schemas.microsoft.com/office/powerpoint/2010/main" val="1827377589"/>
       </p:ext>
     </p:extLst>
   </p:cSld>
@@ -4140,8 +4130,8 @@
         </p:blipFill>
         <p:spPr>
           <a:xfrm>
-            <a:off x="162919" y="96640"/>
-            <a:ext cx="9128539" cy="4901037"/>
+            <a:off x="160632" y="128482"/>
+            <a:ext cx="8415452" cy="4303159"/>
           </a:xfrm>
           <a:prstGeom prst="rect">
             <a:avLst/>
@@ -4156,8 +4146,8 @@
         </p:nvSpPr>
         <p:spPr>
           <a:xfrm>
-            <a:off x="3119900" y="5756992"/>
-            <a:ext cx="1110475" cy="369332"/>
+            <a:off x="2498681" y="4431642"/>
+            <a:ext cx="3593164" cy="369332"/>
           </a:xfrm>
           <a:prstGeom prst="rect">
             <a:avLst/>
@@ -4172,7 +4162,7 @@
           <a:p>
             <a:r>
               <a:rPr lang="en-US" dirty="0" smtClean="0"/>
-              <a:t>Recursion</a:t>
+              <a:t>While loop with a negated condition </a:t>
             </a:r>
             <a:endParaRPr lang="en-US" dirty="0"/>
           </a:p>
@@ -4186,7 +4176,7 @@
         </p:nvSpPr>
         <p:spPr>
           <a:xfrm>
-            <a:off x="1297657" y="2443614"/>
+            <a:off x="1587866" y="2443614"/>
             <a:ext cx="276098" cy="334559"/>
           </a:xfrm>
           <a:prstGeom prst="star6">
@@ -4219,7 +4209,7 @@
     </p:spTree>
     <p:extLst>
       <p:ext uri="{BB962C8B-B14F-4D97-AF65-F5344CB8AC3E}">
-        <p14:creationId xmlns:p14="http://schemas.microsoft.com/office/powerpoint/2010/main" val="4049173339"/>
+        <p14:creationId xmlns:p14="http://schemas.microsoft.com/office/powerpoint/2010/main" val="531155991"/>
       </p:ext>
     </p:extLst>
   </p:cSld>
@@ -4269,8 +4259,8 @@
         </p:blipFill>
         <p:spPr>
           <a:xfrm>
-            <a:off x="0" y="107950"/>
-            <a:ext cx="8128000" cy="3314700"/>
+            <a:off x="162919" y="96640"/>
+            <a:ext cx="9128539" cy="4901037"/>
           </a:xfrm>
           <a:prstGeom prst="rect">
             <a:avLst/>
@@ -4279,13 +4269,43 @@
       </p:pic>
       <p:sp>
         <p:nvSpPr>
-          <p:cNvPr id="3" name="6-Point Star 2"/>
+          <p:cNvPr id="3" name="TextBox 2"/>
+          <p:cNvSpPr txBox="1"/>
+          <p:nvPr/>
+        </p:nvSpPr>
+        <p:spPr>
+          <a:xfrm>
+            <a:off x="3119900" y="5756992"/>
+            <a:ext cx="1110475" cy="369332"/>
+          </a:xfrm>
+          <a:prstGeom prst="rect">
+            <a:avLst/>
+          </a:prstGeom>
+          <a:noFill/>
+        </p:spPr>
+        <p:txBody>
+          <a:bodyPr wrap="none" rtlCol="0">
+            <a:spAutoFit/>
+          </a:bodyPr>
+          <a:lstStyle/>
+          <a:p>
+            <a:r>
+              <a:rPr lang="en-US" dirty="0" smtClean="0"/>
+              <a:t>Recursion</a:t>
+            </a:r>
+            <a:endParaRPr lang="en-US" dirty="0"/>
+          </a:p>
+        </p:txBody>
+      </p:sp>
+      <p:sp>
+        <p:nvSpPr>
+          <p:cNvPr id="4" name="6-Point Star 3"/>
           <p:cNvSpPr/>
           <p:nvPr/>
         </p:nvSpPr>
         <p:spPr>
           <a:xfrm>
-            <a:off x="1136310" y="2109055"/>
+            <a:off x="1297657" y="2443614"/>
             <a:ext cx="276098" cy="334559"/>
           </a:xfrm>
           <a:prstGeom prst="star6">
@@ -4318,7 +4338,7 @@
     </p:spTree>
     <p:extLst>
       <p:ext uri="{BB962C8B-B14F-4D97-AF65-F5344CB8AC3E}">
-        <p14:creationId xmlns:p14="http://schemas.microsoft.com/office/powerpoint/2010/main" val="2913306491"/>
+        <p14:creationId xmlns:p14="http://schemas.microsoft.com/office/powerpoint/2010/main" val="4049173339"/>
       </p:ext>
     </p:extLst>
   </p:cSld>
@@ -4368,8 +4388,8 @@
         </p:blipFill>
         <p:spPr>
           <a:xfrm>
-            <a:off x="0" y="0"/>
-            <a:ext cx="9077717" cy="3506657"/>
+            <a:off x="0" y="107950"/>
+            <a:ext cx="8128000" cy="3314700"/>
           </a:xfrm>
           <a:prstGeom prst="rect">
             <a:avLst/>
@@ -4378,43 +4398,13 @@
       </p:pic>
       <p:sp>
         <p:nvSpPr>
-          <p:cNvPr id="3" name="TextBox 2"/>
-          <p:cNvSpPr txBox="1"/>
-          <p:nvPr/>
-        </p:nvSpPr>
-        <p:spPr>
-          <a:xfrm>
-            <a:off x="3064681" y="5439460"/>
-            <a:ext cx="1231189" cy="369332"/>
-          </a:xfrm>
-          <a:prstGeom prst="rect">
-            <a:avLst/>
-          </a:prstGeom>
-          <a:noFill/>
-        </p:spPr>
-        <p:txBody>
-          <a:bodyPr wrap="none" rtlCol="0">
-            <a:spAutoFit/>
-          </a:bodyPr>
-          <a:lstStyle/>
-          <a:p>
-            <a:r>
-              <a:rPr lang="en-US" dirty="0" err="1" smtClean="0"/>
-              <a:t>String.gsub</a:t>
-            </a:r>
-            <a:endParaRPr lang="en-US" dirty="0"/>
-          </a:p>
-        </p:txBody>
-      </p:sp>
-      <p:sp>
-        <p:nvSpPr>
-          <p:cNvPr id="4" name="6-Point Star 3"/>
+          <p:cNvPr id="3" name="6-Point Star 2"/>
           <p:cNvSpPr/>
           <p:nvPr/>
         </p:nvSpPr>
         <p:spPr>
           <a:xfrm>
-            <a:off x="1051644" y="1879170"/>
+            <a:off x="1136310" y="2109055"/>
             <a:ext cx="276098" cy="334559"/>
           </a:xfrm>
           <a:prstGeom prst="star6">
@@ -4447,7 +4437,7 @@
     </p:spTree>
     <p:extLst>
       <p:ext uri="{BB962C8B-B14F-4D97-AF65-F5344CB8AC3E}">
-        <p14:creationId xmlns:p14="http://schemas.microsoft.com/office/powerpoint/2010/main" val="2489754715"/>
+        <p14:creationId xmlns:p14="http://schemas.microsoft.com/office/powerpoint/2010/main" val="2913306491"/>
       </p:ext>
     </p:extLst>
   </p:cSld>
@@ -4497,8 +4487,8 @@
         </p:blipFill>
         <p:spPr>
           <a:xfrm>
-            <a:off x="146864" y="158750"/>
-            <a:ext cx="8920184" cy="3610216"/>
+            <a:off x="0" y="0"/>
+            <a:ext cx="9077717" cy="3506657"/>
           </a:xfrm>
           <a:prstGeom prst="rect">
             <a:avLst/>
@@ -4513,8 +4503,8 @@
         </p:nvSpPr>
         <p:spPr>
           <a:xfrm>
-            <a:off x="2443462" y="4901037"/>
-            <a:ext cx="2422658" cy="369332"/>
+            <a:off x="3064681" y="5439460"/>
+            <a:ext cx="1231189" cy="369332"/>
           </a:xfrm>
           <a:prstGeom prst="rect">
             <a:avLst/>
@@ -4528,8 +4518,8 @@
           <a:lstStyle/>
           <a:p>
             <a:r>
-              <a:rPr lang="en-US" dirty="0" smtClean="0"/>
-              <a:t>Anything but false or nil</a:t>
+              <a:rPr lang="en-US" dirty="0" err="1" smtClean="0"/>
+              <a:t>String.gsub</a:t>
             </a:r>
             <a:endParaRPr lang="en-US" dirty="0"/>
           </a:p>
@@ -4543,7 +4533,7 @@
         </p:nvSpPr>
         <p:spPr>
           <a:xfrm>
-            <a:off x="1297657" y="2109055"/>
+            <a:off x="1051644" y="1879170"/>
             <a:ext cx="276098" cy="334559"/>
           </a:xfrm>
           <a:prstGeom prst="star6">
@@ -4576,7 +4566,7 @@
     </p:spTree>
     <p:extLst>
       <p:ext uri="{BB962C8B-B14F-4D97-AF65-F5344CB8AC3E}">
-        <p14:creationId xmlns:p14="http://schemas.microsoft.com/office/powerpoint/2010/main" val="3387246110"/>
+        <p14:creationId xmlns:p14="http://schemas.microsoft.com/office/powerpoint/2010/main" val="2489754715"/>
       </p:ext>
     </p:extLst>
   </p:cSld>
@@ -4626,8 +4616,8 @@
         </p:blipFill>
         <p:spPr>
           <a:xfrm>
-            <a:off x="-1" y="249417"/>
-            <a:ext cx="8476189" cy="4151954"/>
+            <a:off x="146864" y="158750"/>
+            <a:ext cx="8920184" cy="3610216"/>
           </a:xfrm>
           <a:prstGeom prst="rect">
             <a:avLst/>
@@ -4642,8 +4632,8 @@
         </p:nvSpPr>
         <p:spPr>
           <a:xfrm>
-            <a:off x="635024" y="4970065"/>
-            <a:ext cx="5713486" cy="646331"/>
+            <a:off x="2443462" y="4901037"/>
+            <a:ext cx="2422658" cy="369332"/>
           </a:xfrm>
           <a:prstGeom prst="rect">
             <a:avLst/>
@@ -4658,13 +4648,7 @@
           <a:p>
             <a:r>
               <a:rPr lang="en-US" dirty="0" smtClean="0"/>
-              <a:t>Whenever a float is used, the result will be float, otherwise </a:t>
-            </a:r>
-          </a:p>
-          <a:p>
-            <a:r>
-              <a:rPr lang="en-US" dirty="0" smtClean="0"/>
-              <a:t>Truncation will happen</a:t>
+              <a:t>Anything but false or nil</a:t>
             </a:r>
             <a:endParaRPr lang="en-US" dirty="0"/>
           </a:p>
@@ -4678,7 +4662,7 @@
         </p:nvSpPr>
         <p:spPr>
           <a:xfrm>
-            <a:off x="1573755" y="1399391"/>
+            <a:off x="1297657" y="2109055"/>
             <a:ext cx="276098" cy="334559"/>
           </a:xfrm>
           <a:prstGeom prst="star6">
@@ -4711,7 +4695,7 @@
     </p:spTree>
     <p:extLst>
       <p:ext uri="{BB962C8B-B14F-4D97-AF65-F5344CB8AC3E}">
-        <p14:creationId xmlns:p14="http://schemas.microsoft.com/office/powerpoint/2010/main" val="4266990847"/>
+        <p14:creationId xmlns:p14="http://schemas.microsoft.com/office/powerpoint/2010/main" val="3387246110"/>
       </p:ext>
     </p:extLst>
   </p:cSld>
@@ -5035,8 +5019,8 @@
         </p:blipFill>
         <p:spPr>
           <a:xfrm>
-            <a:off x="0" y="206357"/>
-            <a:ext cx="8986904" cy="3921558"/>
+            <a:off x="-1" y="249417"/>
+            <a:ext cx="8476189" cy="4151954"/>
           </a:xfrm>
           <a:prstGeom prst="rect">
             <a:avLst/>
@@ -5045,14 +5029,50 @@
       </p:pic>
       <p:sp>
         <p:nvSpPr>
-          <p:cNvPr id="3" name="6-Point Star 2"/>
+          <p:cNvPr id="3" name="TextBox 2"/>
+          <p:cNvSpPr txBox="1"/>
+          <p:nvPr/>
+        </p:nvSpPr>
+        <p:spPr>
+          <a:xfrm>
+            <a:off x="635024" y="4970065"/>
+            <a:ext cx="5713486" cy="646331"/>
+          </a:xfrm>
+          <a:prstGeom prst="rect">
+            <a:avLst/>
+          </a:prstGeom>
+          <a:noFill/>
+        </p:spPr>
+        <p:txBody>
+          <a:bodyPr wrap="none" rtlCol="0">
+            <a:spAutoFit/>
+          </a:bodyPr>
+          <a:lstStyle/>
+          <a:p>
+            <a:r>
+              <a:rPr lang="en-US" dirty="0" smtClean="0"/>
+              <a:t>Whenever a float is used, the result will be float, otherwise </a:t>
+            </a:r>
+          </a:p>
+          <a:p>
+            <a:r>
+              <a:rPr lang="en-US" dirty="0" smtClean="0"/>
+              <a:t>Truncation will happen</a:t>
+            </a:r>
+            <a:endParaRPr lang="en-US" dirty="0"/>
+          </a:p>
+        </p:txBody>
+      </p:sp>
+      <p:sp>
+        <p:nvSpPr>
+          <p:cNvPr id="4" name="6-Point Star 3"/>
           <p:cNvSpPr/>
           <p:nvPr/>
         </p:nvSpPr>
         <p:spPr>
           <a:xfrm>
-            <a:off x="1221730" y="1283933"/>
-            <a:ext cx="234683" cy="279336"/>
+            <a:off x="1573755" y="1399391"/>
+            <a:ext cx="276098" cy="334559"/>
           </a:xfrm>
           <a:prstGeom prst="star6">
             <a:avLst/>
@@ -5081,40 +5101,10 @@
           </a:p>
         </p:txBody>
       </p:sp>
-      <p:sp>
-        <p:nvSpPr>
-          <p:cNvPr id="4" name="TextBox 3"/>
-          <p:cNvSpPr txBox="1"/>
-          <p:nvPr/>
-        </p:nvSpPr>
-        <p:spPr>
-          <a:xfrm>
-            <a:off x="2540096" y="5687964"/>
-            <a:ext cx="5211683" cy="369332"/>
-          </a:xfrm>
-          <a:prstGeom prst="rect">
-            <a:avLst/>
-          </a:prstGeom>
-          <a:noFill/>
-        </p:spPr>
-        <p:txBody>
-          <a:bodyPr wrap="none" rtlCol="0">
-            <a:spAutoFit/>
-          </a:bodyPr>
-          <a:lstStyle/>
-          <a:p>
-            <a:r>
-              <a:rPr lang="en-US" dirty="0" smtClean="0"/>
-              <a:t>Ruby sucks! There is no x++ x-- ++x –x as in Java and C</a:t>
-            </a:r>
-            <a:endParaRPr lang="en-US" dirty="0"/>
-          </a:p>
-        </p:txBody>
-      </p:sp>
     </p:spTree>
     <p:extLst>
       <p:ext uri="{BB962C8B-B14F-4D97-AF65-F5344CB8AC3E}">
-        <p14:creationId xmlns:p14="http://schemas.microsoft.com/office/powerpoint/2010/main" val="2307162450"/>
+        <p14:creationId xmlns:p14="http://schemas.microsoft.com/office/powerpoint/2010/main" val="4266990847"/>
       </p:ext>
     </p:extLst>
   </p:cSld>
@@ -5164,8 +5154,8 @@
         </p:blipFill>
         <p:spPr>
           <a:xfrm>
-            <a:off x="137466" y="246099"/>
-            <a:ext cx="8727881" cy="3467643"/>
+            <a:off x="0" y="206357"/>
+            <a:ext cx="8986904" cy="3921558"/>
           </a:xfrm>
           <a:prstGeom prst="rect">
             <a:avLst/>
@@ -5180,8 +5170,8 @@
         </p:nvSpPr>
         <p:spPr>
           <a:xfrm>
-            <a:off x="1297657" y="1187725"/>
-            <a:ext cx="276098" cy="334559"/>
+            <a:off x="1221730" y="1283933"/>
+            <a:ext cx="234683" cy="279336"/>
           </a:xfrm>
           <a:prstGeom prst="star6">
             <a:avLst/>
@@ -5210,10 +5200,40 @@
           </a:p>
         </p:txBody>
       </p:sp>
+      <p:sp>
+        <p:nvSpPr>
+          <p:cNvPr id="4" name="TextBox 3"/>
+          <p:cNvSpPr txBox="1"/>
+          <p:nvPr/>
+        </p:nvSpPr>
+        <p:spPr>
+          <a:xfrm>
+            <a:off x="2540096" y="5687964"/>
+            <a:ext cx="5211683" cy="369332"/>
+          </a:xfrm>
+          <a:prstGeom prst="rect">
+            <a:avLst/>
+          </a:prstGeom>
+          <a:noFill/>
+        </p:spPr>
+        <p:txBody>
+          <a:bodyPr wrap="none" rtlCol="0">
+            <a:spAutoFit/>
+          </a:bodyPr>
+          <a:lstStyle/>
+          <a:p>
+            <a:r>
+              <a:rPr lang="en-US" dirty="0" smtClean="0"/>
+              <a:t>Ruby sucks! There is no x++ x-- ++x –x as in Java and C</a:t>
+            </a:r>
+            <a:endParaRPr lang="en-US" dirty="0"/>
+          </a:p>
+        </p:txBody>
+      </p:sp>
     </p:spTree>
     <p:extLst>
       <p:ext uri="{BB962C8B-B14F-4D97-AF65-F5344CB8AC3E}">
-        <p14:creationId xmlns:p14="http://schemas.microsoft.com/office/powerpoint/2010/main" val="2644237074"/>
+        <p14:creationId xmlns:p14="http://schemas.microsoft.com/office/powerpoint/2010/main" val="2307162450"/>
       </p:ext>
     </p:extLst>
   </p:cSld>
@@ -5263,8 +5283,8 @@
         </p:blipFill>
         <p:spPr>
           <a:xfrm>
-            <a:off x="0" y="0"/>
-            <a:ext cx="8931750" cy="3839818"/>
+            <a:off x="137466" y="246099"/>
+            <a:ext cx="8727881" cy="3467643"/>
           </a:xfrm>
           <a:prstGeom prst="rect">
             <a:avLst/>
@@ -5273,44 +5293,14 @@
       </p:pic>
       <p:sp>
         <p:nvSpPr>
-          <p:cNvPr id="3" name="TextBox 2"/>
-          <p:cNvSpPr txBox="1"/>
-          <p:nvPr/>
-        </p:nvSpPr>
-        <p:spPr>
-          <a:xfrm>
-            <a:off x="1104390" y="5052900"/>
-            <a:ext cx="4723205" cy="369332"/>
-          </a:xfrm>
-          <a:prstGeom prst="rect">
-            <a:avLst/>
-          </a:prstGeom>
-          <a:noFill/>
-        </p:spPr>
-        <p:txBody>
-          <a:bodyPr wrap="none" rtlCol="0">
-            <a:spAutoFit/>
-          </a:bodyPr>
-          <a:lstStyle/>
-          <a:p>
-            <a:r>
-              <a:rPr lang="en-US" dirty="0" smtClean="0"/>
-              <a:t>Stat can be used to compare modification times.</a:t>
-            </a:r>
-            <a:endParaRPr lang="en-US" dirty="0"/>
-          </a:p>
-        </p:txBody>
-      </p:sp>
-      <p:sp>
-        <p:nvSpPr>
-          <p:cNvPr id="5" name="6-Point Star 4"/>
+          <p:cNvPr id="3" name="6-Point Star 2"/>
           <p:cNvSpPr/>
           <p:nvPr/>
         </p:nvSpPr>
         <p:spPr>
           <a:xfrm>
-            <a:off x="1021560" y="1837986"/>
-            <a:ext cx="289903" cy="387958"/>
+            <a:off x="1297657" y="1187725"/>
+            <a:ext cx="276098" cy="334559"/>
           </a:xfrm>
           <a:prstGeom prst="star6">
             <a:avLst/>
@@ -5342,7 +5332,7 @@
     </p:spTree>
     <p:extLst>
       <p:ext uri="{BB962C8B-B14F-4D97-AF65-F5344CB8AC3E}">
-        <p14:creationId xmlns:p14="http://schemas.microsoft.com/office/powerpoint/2010/main" val="3403037026"/>
+        <p14:creationId xmlns:p14="http://schemas.microsoft.com/office/powerpoint/2010/main" val="2644237074"/>
       </p:ext>
     </p:extLst>
   </p:cSld>
@@ -5392,8 +5382,8 @@
         </p:blipFill>
         <p:spPr>
           <a:xfrm>
-            <a:off x="170744" y="100189"/>
-            <a:ext cx="8153400" cy="5092700"/>
+            <a:off x="0" y="0"/>
+            <a:ext cx="8931750" cy="3839818"/>
           </a:xfrm>
           <a:prstGeom prst="rect">
             <a:avLst/>
@@ -5402,14 +5392,44 @@
       </p:pic>
       <p:sp>
         <p:nvSpPr>
-          <p:cNvPr id="3" name="6-Point Star 2"/>
+          <p:cNvPr id="3" name="TextBox 2"/>
+          <p:cNvSpPr txBox="1"/>
+          <p:nvPr/>
+        </p:nvSpPr>
+        <p:spPr>
+          <a:xfrm>
+            <a:off x="1104390" y="5052900"/>
+            <a:ext cx="4723205" cy="369332"/>
+          </a:xfrm>
+          <a:prstGeom prst="rect">
+            <a:avLst/>
+          </a:prstGeom>
+          <a:noFill/>
+        </p:spPr>
+        <p:txBody>
+          <a:bodyPr wrap="none" rtlCol="0">
+            <a:spAutoFit/>
+          </a:bodyPr>
+          <a:lstStyle/>
+          <a:p>
+            <a:r>
+              <a:rPr lang="en-US" dirty="0" smtClean="0"/>
+              <a:t>Stat can be used to compare modification times.</a:t>
+            </a:r>
+            <a:endParaRPr lang="en-US" dirty="0"/>
+          </a:p>
+        </p:txBody>
+      </p:sp>
+      <p:sp>
+        <p:nvSpPr>
+          <p:cNvPr id="5" name="6-Point Star 4"/>
           <p:cNvSpPr/>
           <p:nvPr/>
         </p:nvSpPr>
         <p:spPr>
           <a:xfrm>
-            <a:off x="1062974" y="2606601"/>
-            <a:ext cx="293181" cy="306948"/>
+            <a:off x="1021560" y="1837986"/>
+            <a:ext cx="289903" cy="387958"/>
           </a:xfrm>
           <a:prstGeom prst="star6">
             <a:avLst/>
@@ -5441,7 +5461,7 @@
     </p:spTree>
     <p:extLst>
       <p:ext uri="{BB962C8B-B14F-4D97-AF65-F5344CB8AC3E}">
-        <p14:creationId xmlns:p14="http://schemas.microsoft.com/office/powerpoint/2010/main" val="1054710666"/>
+        <p14:creationId xmlns:p14="http://schemas.microsoft.com/office/powerpoint/2010/main" val="3403037026"/>
       </p:ext>
     </p:extLst>
   </p:cSld>
@@ -5491,8 +5511,8 @@
         </p:blipFill>
         <p:spPr>
           <a:xfrm>
-            <a:off x="455788" y="234950"/>
-            <a:ext cx="7694927" cy="4153606"/>
+            <a:off x="170744" y="100189"/>
+            <a:ext cx="8153400" cy="5092700"/>
           </a:xfrm>
           <a:prstGeom prst="rect">
             <a:avLst/>
@@ -5501,71 +5521,13 @@
       </p:pic>
       <p:sp>
         <p:nvSpPr>
-          <p:cNvPr id="3" name="TextBox 2"/>
-          <p:cNvSpPr txBox="1"/>
-          <p:nvPr/>
-        </p:nvSpPr>
-        <p:spPr>
-          <a:xfrm>
-            <a:off x="2402047" y="5281522"/>
-            <a:ext cx="3173766" cy="923330"/>
-          </a:xfrm>
-          <a:prstGeom prst="rect">
-            <a:avLst/>
-          </a:prstGeom>
-          <a:noFill/>
-        </p:spPr>
-        <p:txBody>
-          <a:bodyPr wrap="none" rtlCol="0">
-            <a:spAutoFit/>
-          </a:bodyPr>
-          <a:lstStyle/>
-          <a:p>
-            <a:r>
-              <a:rPr lang="en-US" dirty="0" smtClean="0"/>
-              <a:t>This will iterate over the tenths:</a:t>
-            </a:r>
-          </a:p>
-          <a:p>
-            <a:endParaRPr lang="en-US" dirty="0" smtClean="0"/>
-          </a:p>
-          <a:p>
-            <a:r>
-              <a:rPr lang="en-US" dirty="0" smtClean="0"/>
-              <a:t>0</a:t>
-            </a:r>
-            <a:r>
-              <a:rPr lang="en-US" dirty="0"/>
-              <a:t>.step(10,0.1) {|</a:t>
-            </a:r>
-            <a:r>
-              <a:rPr lang="en-US" dirty="0" err="1"/>
-              <a:t>i</a:t>
-            </a:r>
-            <a:r>
-              <a:rPr lang="en-US" dirty="0"/>
-              <a:t>| puts </a:t>
-            </a:r>
-            <a:r>
-              <a:rPr lang="en-US" dirty="0" err="1"/>
-              <a:t>i</a:t>
-            </a:r>
-            <a:r>
-              <a:rPr lang="en-US" dirty="0"/>
-              <a:t>}</a:t>
-            </a:r>
-          </a:p>
-        </p:txBody>
-      </p:sp>
-      <p:sp>
-        <p:nvSpPr>
-          <p:cNvPr id="4" name="6-Point Star 3"/>
+          <p:cNvPr id="3" name="6-Point Star 2"/>
           <p:cNvSpPr/>
           <p:nvPr/>
         </p:nvSpPr>
         <p:spPr>
           <a:xfrm>
-            <a:off x="1655640" y="1830490"/>
+            <a:off x="1062974" y="2606601"/>
             <a:ext cx="293181" cy="306948"/>
           </a:xfrm>
           <a:prstGeom prst="star6">
@@ -5598,7 +5560,7 @@
     </p:spTree>
     <p:extLst>
       <p:ext uri="{BB962C8B-B14F-4D97-AF65-F5344CB8AC3E}">
-        <p14:creationId xmlns:p14="http://schemas.microsoft.com/office/powerpoint/2010/main" val="4077911947"/>
+        <p14:creationId xmlns:p14="http://schemas.microsoft.com/office/powerpoint/2010/main" val="1054710666"/>
       </p:ext>
     </p:extLst>
   </p:cSld>
@@ -5648,14 +5610,72 @@
         </p:blipFill>
         <p:spPr>
           <a:xfrm>
-            <a:off x="406898" y="285750"/>
-            <a:ext cx="7503291" cy="4300030"/>
+            <a:off x="455788" y="234950"/>
+            <a:ext cx="7694927" cy="4153606"/>
           </a:xfrm>
           <a:prstGeom prst="rect">
             <a:avLst/>
           </a:prstGeom>
         </p:spPr>
       </p:pic>
+      <p:sp>
+        <p:nvSpPr>
+          <p:cNvPr id="3" name="TextBox 2"/>
+          <p:cNvSpPr txBox="1"/>
+          <p:nvPr/>
+        </p:nvSpPr>
+        <p:spPr>
+          <a:xfrm>
+            <a:off x="2402047" y="5281522"/>
+            <a:ext cx="3173766" cy="923330"/>
+          </a:xfrm>
+          <a:prstGeom prst="rect">
+            <a:avLst/>
+          </a:prstGeom>
+          <a:noFill/>
+        </p:spPr>
+        <p:txBody>
+          <a:bodyPr wrap="none" rtlCol="0">
+            <a:spAutoFit/>
+          </a:bodyPr>
+          <a:lstStyle/>
+          <a:p>
+            <a:r>
+              <a:rPr lang="en-US" dirty="0" smtClean="0"/>
+              <a:t>This will iterate over the tenths:</a:t>
+            </a:r>
+          </a:p>
+          <a:p>
+            <a:endParaRPr lang="en-US" dirty="0" smtClean="0"/>
+          </a:p>
+          <a:p>
+            <a:r>
+              <a:rPr lang="en-US" dirty="0" smtClean="0"/>
+              <a:t>0</a:t>
+            </a:r>
+            <a:r>
+              <a:rPr lang="en-US" dirty="0"/>
+              <a:t>.step(10,0.1) {|</a:t>
+            </a:r>
+            <a:r>
+              <a:rPr lang="en-US" dirty="0" err="1"/>
+              <a:t>i</a:t>
+            </a:r>
+            <a:r>
+              <a:rPr lang="en-US" dirty="0"/>
+              <a:t>| puts </a:t>
+            </a:r>
+            <a:r>
+              <a:rPr lang="en-US" dirty="0" err="1"/>
+              <a:t>i</a:t>
+            </a:r>
+            <a:r>
+              <a:rPr lang="en-US" dirty="0"/>
+              <a:t>}</a:t>
+            </a:r>
+          </a:p>
+        </p:txBody>
+      </p:sp>
       <p:sp>
         <p:nvSpPr>
           <p:cNvPr id="4" name="6-Point Star 3"/>
@@ -5663,9 +5683,9 @@
           <p:nvPr/>
         </p:nvSpPr>
         <p:spPr>
-          <a:xfrm flipH="1" flipV="1">
-            <a:off x="1615171" y="2623091"/>
-            <a:ext cx="248486" cy="220891"/>
+          <a:xfrm>
+            <a:off x="1655640" y="1830490"/>
+            <a:ext cx="293181" cy="306948"/>
           </a:xfrm>
           <a:prstGeom prst="star6">
             <a:avLst/>
@@ -5697,7 +5717,7 @@
     </p:spTree>
     <p:extLst>
       <p:ext uri="{BB962C8B-B14F-4D97-AF65-F5344CB8AC3E}">
-        <p14:creationId xmlns:p14="http://schemas.microsoft.com/office/powerpoint/2010/main" val="3457213936"/>
+        <p14:creationId xmlns:p14="http://schemas.microsoft.com/office/powerpoint/2010/main" val="4077911947"/>
       </p:ext>
     </p:extLst>
   </p:cSld>
@@ -5747,8 +5767,8 @@
         </p:blipFill>
         <p:spPr>
           <a:xfrm>
-            <a:off x="365507" y="253999"/>
-            <a:ext cx="8713749" cy="4094807"/>
+            <a:off x="406898" y="285750"/>
+            <a:ext cx="7503291" cy="4300030"/>
           </a:xfrm>
           <a:prstGeom prst="rect">
             <a:avLst/>
@@ -5762,9 +5782,9 @@
           <p:nvPr/>
         </p:nvSpPr>
         <p:spPr>
-          <a:xfrm>
-            <a:off x="1546144" y="2015638"/>
-            <a:ext cx="179465" cy="248504"/>
+          <a:xfrm flipH="1" flipV="1">
+            <a:off x="1615171" y="2623091"/>
+            <a:ext cx="248486" cy="220891"/>
           </a:xfrm>
           <a:prstGeom prst="star6">
             <a:avLst/>
@@ -5796,7 +5816,7 @@
     </p:spTree>
     <p:extLst>
       <p:ext uri="{BB962C8B-B14F-4D97-AF65-F5344CB8AC3E}">
-        <p14:creationId xmlns:p14="http://schemas.microsoft.com/office/powerpoint/2010/main" val="2180397257"/>
+        <p14:creationId xmlns:p14="http://schemas.microsoft.com/office/powerpoint/2010/main" val="3457213936"/>
       </p:ext>
     </p:extLst>
   </p:cSld>
@@ -5846,8 +5866,8 @@
         </p:blipFill>
         <p:spPr>
           <a:xfrm>
-            <a:off x="270525" y="194193"/>
-            <a:ext cx="8115506" cy="3850887"/>
+            <a:off x="365507" y="253999"/>
+            <a:ext cx="8713749" cy="4094807"/>
           </a:xfrm>
           <a:prstGeom prst="rect">
             <a:avLst/>
@@ -5856,13 +5876,13 @@
       </p:pic>
       <p:sp>
         <p:nvSpPr>
-          <p:cNvPr id="3" name="6-Point Star 2"/>
+          <p:cNvPr id="4" name="6-Point Star 3"/>
           <p:cNvSpPr/>
           <p:nvPr/>
         </p:nvSpPr>
         <p:spPr>
           <a:xfrm>
-            <a:off x="1449509" y="1380880"/>
+            <a:off x="1546144" y="2015638"/>
             <a:ext cx="179465" cy="248504"/>
           </a:xfrm>
           <a:prstGeom prst="star6">
@@ -5895,7 +5915,7 @@
     </p:spTree>
     <p:extLst>
       <p:ext uri="{BB962C8B-B14F-4D97-AF65-F5344CB8AC3E}">
-        <p14:creationId xmlns:p14="http://schemas.microsoft.com/office/powerpoint/2010/main" val="925924006"/>
+        <p14:creationId xmlns:p14="http://schemas.microsoft.com/office/powerpoint/2010/main" val="2180397257"/>
       </p:ext>
     </p:extLst>
   </p:cSld>
@@ -5945,8 +5965,8 @@
         </p:blipFill>
         <p:spPr>
           <a:xfrm>
-            <a:off x="372533" y="309032"/>
-            <a:ext cx="7505180" cy="3952523"/>
+            <a:off x="270525" y="194193"/>
+            <a:ext cx="8115506" cy="3850887"/>
           </a:xfrm>
           <a:prstGeom prst="rect">
             <a:avLst/>
@@ -5961,7 +5981,7 @@
         </p:nvSpPr>
         <p:spPr>
           <a:xfrm>
-            <a:off x="1628974" y="2890769"/>
+            <a:off x="1449509" y="1380880"/>
             <a:ext cx="179465" cy="248504"/>
           </a:xfrm>
           <a:prstGeom prst="star6">
@@ -5994,7 +6014,7 @@
     </p:spTree>
     <p:extLst>
       <p:ext uri="{BB962C8B-B14F-4D97-AF65-F5344CB8AC3E}">
-        <p14:creationId xmlns:p14="http://schemas.microsoft.com/office/powerpoint/2010/main" val="2229529856"/>
+        <p14:creationId xmlns:p14="http://schemas.microsoft.com/office/powerpoint/2010/main" val="925924006"/>
       </p:ext>
     </p:extLst>
   </p:cSld>
@@ -6044,8 +6064,8 @@
         </p:blipFill>
         <p:spPr>
           <a:xfrm>
-            <a:off x="197555" y="170744"/>
-            <a:ext cx="7792639" cy="5135034"/>
+            <a:off x="372533" y="309032"/>
+            <a:ext cx="7505180" cy="3952523"/>
           </a:xfrm>
           <a:prstGeom prst="rect">
             <a:avLst/>
@@ -6060,7 +6080,7 @@
         </p:nvSpPr>
         <p:spPr>
           <a:xfrm>
-            <a:off x="1339071" y="4947824"/>
+            <a:off x="1628974" y="2890769"/>
             <a:ext cx="179465" cy="248504"/>
           </a:xfrm>
           <a:prstGeom prst="star6">
@@ -6093,7 +6113,7 @@
     </p:spTree>
     <p:extLst>
       <p:ext uri="{BB962C8B-B14F-4D97-AF65-F5344CB8AC3E}">
-        <p14:creationId xmlns:p14="http://schemas.microsoft.com/office/powerpoint/2010/main" val="4169707477"/>
+        <p14:creationId xmlns:p14="http://schemas.microsoft.com/office/powerpoint/2010/main" val="2229529856"/>
       </p:ext>
     </p:extLst>
   </p:cSld>
@@ -6144,7 +6164,7 @@
           <a:p>
             <a:r>
               <a:rPr lang="en-US" dirty="0" smtClean="0"/>
-              <a:t>Crap links</a:t>
+              <a:t>Helpful Links</a:t>
             </a:r>
             <a:endParaRPr lang="en-US" dirty="0"/>
           </a:p>
@@ -6306,8 +6326,8 @@
         </p:blipFill>
         <p:spPr>
           <a:xfrm>
-            <a:off x="241300" y="163688"/>
-            <a:ext cx="8873918" cy="4182534"/>
+            <a:off x="197555" y="170744"/>
+            <a:ext cx="7792639" cy="5135034"/>
           </a:xfrm>
           <a:prstGeom prst="rect">
             <a:avLst/>
@@ -6322,7 +6342,7 @@
         </p:nvSpPr>
         <p:spPr>
           <a:xfrm>
-            <a:off x="1332640" y="2086435"/>
+            <a:off x="1339071" y="4947824"/>
             <a:ext cx="179465" cy="248504"/>
           </a:xfrm>
           <a:prstGeom prst="star6">
@@ -6355,7 +6375,7 @@
     </p:spTree>
     <p:extLst>
       <p:ext uri="{BB962C8B-B14F-4D97-AF65-F5344CB8AC3E}">
-        <p14:creationId xmlns:p14="http://schemas.microsoft.com/office/powerpoint/2010/main" val="3357341337"/>
+        <p14:creationId xmlns:p14="http://schemas.microsoft.com/office/powerpoint/2010/main" val="4169707477"/>
       </p:ext>
     </p:extLst>
   </p:cSld>
@@ -6405,8 +6425,8 @@
         </p:blipFill>
         <p:spPr>
           <a:xfrm>
-            <a:off x="313267" y="342900"/>
-            <a:ext cx="8655462" cy="3283656"/>
+            <a:off x="241300" y="163688"/>
+            <a:ext cx="8873918" cy="4182534"/>
           </a:xfrm>
           <a:prstGeom prst="rect">
             <a:avLst/>
@@ -6421,7 +6441,7 @@
         </p:nvSpPr>
         <p:spPr>
           <a:xfrm>
-            <a:off x="1643084" y="957547"/>
+            <a:off x="1332640" y="2086435"/>
             <a:ext cx="179465" cy="248504"/>
           </a:xfrm>
           <a:prstGeom prst="star6">
@@ -6454,7 +6474,7 @@
     </p:spTree>
     <p:extLst>
       <p:ext uri="{BB962C8B-B14F-4D97-AF65-F5344CB8AC3E}">
-        <p14:creationId xmlns:p14="http://schemas.microsoft.com/office/powerpoint/2010/main" val="180028464"/>
+        <p14:creationId xmlns:p14="http://schemas.microsoft.com/office/powerpoint/2010/main" val="3357341337"/>
       </p:ext>
     </p:extLst>
   </p:cSld>
@@ -6504,8 +6524,8 @@
         </p:blipFill>
         <p:spPr>
           <a:xfrm>
-            <a:off x="368300" y="260350"/>
-            <a:ext cx="8718348" cy="3606094"/>
+            <a:off x="313267" y="342900"/>
+            <a:ext cx="8655462" cy="3283656"/>
           </a:xfrm>
           <a:prstGeom prst="rect">
             <a:avLst/>
@@ -6520,7 +6540,7 @@
         </p:nvSpPr>
         <p:spPr>
           <a:xfrm>
-            <a:off x="1512105" y="3003657"/>
+            <a:off x="1643084" y="957547"/>
             <a:ext cx="179465" cy="248504"/>
           </a:xfrm>
           <a:prstGeom prst="star6">
@@ -6553,7 +6573,7 @@
     </p:spTree>
     <p:extLst>
       <p:ext uri="{BB962C8B-B14F-4D97-AF65-F5344CB8AC3E}">
-        <p14:creationId xmlns:p14="http://schemas.microsoft.com/office/powerpoint/2010/main" val="864818460"/>
+        <p14:creationId xmlns:p14="http://schemas.microsoft.com/office/powerpoint/2010/main" val="180028464"/>
       </p:ext>
     </p:extLst>
   </p:cSld>
@@ -6603,8 +6623,8 @@
         </p:blipFill>
         <p:spPr>
           <a:xfrm>
-            <a:off x="342899" y="272344"/>
-            <a:ext cx="8641081" cy="3819877"/>
+            <a:off x="368300" y="260350"/>
+            <a:ext cx="8718348" cy="3606094"/>
           </a:xfrm>
           <a:prstGeom prst="rect">
             <a:avLst/>
@@ -6619,7 +6639,7 @@
         </p:nvSpPr>
         <p:spPr>
           <a:xfrm>
-            <a:off x="1755973" y="2072324"/>
+            <a:off x="1512105" y="3003657"/>
             <a:ext cx="179465" cy="248504"/>
           </a:xfrm>
           <a:prstGeom prst="star6">
@@ -6652,7 +6672,7 @@
     </p:spTree>
     <p:extLst>
       <p:ext uri="{BB962C8B-B14F-4D97-AF65-F5344CB8AC3E}">
-        <p14:creationId xmlns:p14="http://schemas.microsoft.com/office/powerpoint/2010/main" val="2821377891"/>
+        <p14:creationId xmlns:p14="http://schemas.microsoft.com/office/powerpoint/2010/main" val="864818460"/>
       </p:ext>
     </p:extLst>
   </p:cSld>
@@ -6702,8 +6722,8 @@
         </p:blipFill>
         <p:spPr>
           <a:xfrm>
-            <a:off x="213078" y="279400"/>
-            <a:ext cx="8725340" cy="3121378"/>
+            <a:off x="342899" y="272344"/>
+            <a:ext cx="8641081" cy="3819877"/>
           </a:xfrm>
           <a:prstGeom prst="rect">
             <a:avLst/>
@@ -6718,7 +6738,7 @@
         </p:nvSpPr>
         <p:spPr>
           <a:xfrm>
-            <a:off x="1304418" y="2537991"/>
+            <a:off x="1755973" y="2072324"/>
             <a:ext cx="179465" cy="248504"/>
           </a:xfrm>
           <a:prstGeom prst="star6">
@@ -6751,7 +6771,7 @@
     </p:spTree>
     <p:extLst>
       <p:ext uri="{BB962C8B-B14F-4D97-AF65-F5344CB8AC3E}">
-        <p14:creationId xmlns:p14="http://schemas.microsoft.com/office/powerpoint/2010/main" val="454146564"/>
+        <p14:creationId xmlns:p14="http://schemas.microsoft.com/office/powerpoint/2010/main" val="2821377891"/>
       </p:ext>
     </p:extLst>
   </p:cSld>
@@ -6801,8 +6821,8 @@
         </p:blipFill>
         <p:spPr>
           <a:xfrm>
-            <a:off x="0" y="207432"/>
-            <a:ext cx="8995338" cy="3193345"/>
+            <a:off x="213078" y="279400"/>
+            <a:ext cx="8725340" cy="3121378"/>
           </a:xfrm>
           <a:prstGeom prst="rect">
             <a:avLst/>
@@ -6817,7 +6837,7 @@
         </p:nvSpPr>
         <p:spPr>
           <a:xfrm>
-            <a:off x="1219751" y="788213"/>
+            <a:off x="1304418" y="2537991"/>
             <a:ext cx="179465" cy="248504"/>
           </a:xfrm>
           <a:prstGeom prst="star6">
@@ -6850,7 +6870,7 @@
     </p:spTree>
     <p:extLst>
       <p:ext uri="{BB962C8B-B14F-4D97-AF65-F5344CB8AC3E}">
-        <p14:creationId xmlns:p14="http://schemas.microsoft.com/office/powerpoint/2010/main" val="897974803"/>
+        <p14:creationId xmlns:p14="http://schemas.microsoft.com/office/powerpoint/2010/main" val="454146564"/>
       </p:ext>
     </p:extLst>
   </p:cSld>
@@ -6900,8 +6920,8 @@
         </p:blipFill>
         <p:spPr>
           <a:xfrm>
-            <a:off x="420511" y="248356"/>
-            <a:ext cx="8564006" cy="3660422"/>
+            <a:off x="0" y="207432"/>
+            <a:ext cx="8995338" cy="3193345"/>
           </a:xfrm>
           <a:prstGeom prst="rect">
             <a:avLst/>
@@ -6916,7 +6936,7 @@
         </p:nvSpPr>
         <p:spPr>
           <a:xfrm>
-            <a:off x="1727751" y="950041"/>
+            <a:off x="1219751" y="788213"/>
             <a:ext cx="179465" cy="248504"/>
           </a:xfrm>
           <a:prstGeom prst="star6">
@@ -6949,7 +6969,7 @@
     </p:spTree>
     <p:extLst>
       <p:ext uri="{BB962C8B-B14F-4D97-AF65-F5344CB8AC3E}">
-        <p14:creationId xmlns:p14="http://schemas.microsoft.com/office/powerpoint/2010/main" val="36629983"/>
+        <p14:creationId xmlns:p14="http://schemas.microsoft.com/office/powerpoint/2010/main" val="897974803"/>
       </p:ext>
     </p:extLst>
   </p:cSld>
@@ -6999,8 +7019,8 @@
         </p:blipFill>
         <p:spPr>
           <a:xfrm>
-            <a:off x="328787" y="268110"/>
-            <a:ext cx="8823421" cy="3899599"/>
+            <a:off x="420511" y="248356"/>
+            <a:ext cx="8564006" cy="3660422"/>
           </a:xfrm>
           <a:prstGeom prst="rect">
             <a:avLst/>
@@ -7015,7 +7035,7 @@
         </p:nvSpPr>
         <p:spPr>
           <a:xfrm>
-            <a:off x="1468810" y="1666367"/>
+            <a:off x="1727751" y="950041"/>
             <a:ext cx="179465" cy="248504"/>
           </a:xfrm>
           <a:prstGeom prst="star6">
@@ -7048,7 +7068,7 @@
     </p:spTree>
     <p:extLst>
       <p:ext uri="{BB962C8B-B14F-4D97-AF65-F5344CB8AC3E}">
-        <p14:creationId xmlns:p14="http://schemas.microsoft.com/office/powerpoint/2010/main" val="2353386929"/>
+        <p14:creationId xmlns:p14="http://schemas.microsoft.com/office/powerpoint/2010/main" val="36629983"/>
       </p:ext>
     </p:extLst>
   </p:cSld>
@@ -7098,8 +7118,8 @@
         </p:blipFill>
         <p:spPr>
           <a:xfrm>
-            <a:off x="141713" y="237719"/>
-            <a:ext cx="8323940" cy="4255593"/>
+            <a:off x="328787" y="268110"/>
+            <a:ext cx="8823421" cy="3899599"/>
           </a:xfrm>
           <a:prstGeom prst="rect">
             <a:avLst/>
@@ -7114,7 +7134,7 @@
         </p:nvSpPr>
         <p:spPr>
           <a:xfrm>
-            <a:off x="1468810" y="2154770"/>
+            <a:off x="1468810" y="1666367"/>
             <a:ext cx="179465" cy="248504"/>
           </a:xfrm>
           <a:prstGeom prst="star6">
@@ -7147,7 +7167,7 @@
     </p:spTree>
     <p:extLst>
       <p:ext uri="{BB962C8B-B14F-4D97-AF65-F5344CB8AC3E}">
-        <p14:creationId xmlns:p14="http://schemas.microsoft.com/office/powerpoint/2010/main" val="970568996"/>
+        <p14:creationId xmlns:p14="http://schemas.microsoft.com/office/powerpoint/2010/main" val="2353386929"/>
       </p:ext>
     </p:extLst>
   </p:cSld>
@@ -7197,8 +7217,8 @@
         </p:blipFill>
         <p:spPr>
           <a:xfrm>
-            <a:off x="144933" y="178026"/>
-            <a:ext cx="8841985" cy="3892004"/>
+            <a:off x="141713" y="237719"/>
+            <a:ext cx="8323940" cy="4255593"/>
           </a:xfrm>
           <a:prstGeom prst="rect">
             <a:avLst/>
@@ -7213,7 +7233,7 @@
         </p:nvSpPr>
         <p:spPr>
           <a:xfrm>
-            <a:off x="2103834" y="4399903"/>
+            <a:off x="1468810" y="2154770"/>
             <a:ext cx="179465" cy="248504"/>
           </a:xfrm>
           <a:prstGeom prst="star6">
@@ -7246,7 +7266,7 @@
     </p:spTree>
     <p:extLst>
       <p:ext uri="{BB962C8B-B14F-4D97-AF65-F5344CB8AC3E}">
-        <p14:creationId xmlns:p14="http://schemas.microsoft.com/office/powerpoint/2010/main" val="3596146395"/>
+        <p14:creationId xmlns:p14="http://schemas.microsoft.com/office/powerpoint/2010/main" val="970568996"/>
       </p:ext>
     </p:extLst>
   </p:cSld>
@@ -7371,8 +7391,8 @@
         </p:blipFill>
         <p:spPr>
           <a:xfrm>
-            <a:off x="223064" y="196942"/>
-            <a:ext cx="8832362" cy="3710081"/>
+            <a:off x="144933" y="178026"/>
+            <a:ext cx="8841985" cy="3892004"/>
           </a:xfrm>
           <a:prstGeom prst="rect">
             <a:avLst/>
@@ -7387,7 +7407,7 @@
         </p:nvSpPr>
         <p:spPr>
           <a:xfrm>
-            <a:off x="1294840" y="1956287"/>
+            <a:off x="2103834" y="4399903"/>
             <a:ext cx="179465" cy="248504"/>
           </a:xfrm>
           <a:prstGeom prst="star6">
@@ -7417,59 +7437,10 @@
           </a:p>
         </p:txBody>
       </p:sp>
-      <p:sp>
-        <p:nvSpPr>
-          <p:cNvPr id="4" name="TextBox 3"/>
-          <p:cNvSpPr txBox="1"/>
-          <p:nvPr/>
-        </p:nvSpPr>
-        <p:spPr>
-          <a:xfrm>
-            <a:off x="593611" y="4431641"/>
-            <a:ext cx="7979214" cy="1200329"/>
-          </a:xfrm>
-          <a:prstGeom prst="rect">
-            <a:avLst/>
-          </a:prstGeom>
-          <a:noFill/>
-        </p:spPr>
-        <p:txBody>
-          <a:bodyPr wrap="square" rtlCol="0">
-            <a:spAutoFit/>
-          </a:bodyPr>
-          <a:lstStyle/>
-          <a:p>
-            <a:r>
-              <a:rPr lang="en-US" dirty="0" err="1"/>
-              <a:t>Procs</a:t>
-            </a:r>
-            <a:r>
-              <a:rPr lang="en-US" dirty="0"/>
-              <a:t> in Ruby are drop in code snippets, not methods. Because of this, the </a:t>
-            </a:r>
-            <a:r>
-              <a:rPr lang="en-US" dirty="0" err="1"/>
-              <a:t>Proc</a:t>
-            </a:r>
-            <a:r>
-              <a:rPr lang="en-US" dirty="0"/>
-              <a:t> return is the </a:t>
-            </a:r>
-            <a:r>
-              <a:rPr lang="en-US" dirty="0" err="1"/>
-              <a:t>proc_return</a:t>
-            </a:r>
-            <a:r>
-              <a:rPr lang="en-US" dirty="0"/>
-              <a:t> method’s return, and acts accordingly. Lambdas however act just like methods, as they check the number of arguments and do not override the calling methods return.</a:t>
-            </a:r>
-          </a:p>
-        </p:txBody>
-      </p:sp>
     </p:spTree>
     <p:extLst>
       <p:ext uri="{BB962C8B-B14F-4D97-AF65-F5344CB8AC3E}">
-        <p14:creationId xmlns:p14="http://schemas.microsoft.com/office/powerpoint/2010/main" val="3554166487"/>
+        <p14:creationId xmlns:p14="http://schemas.microsoft.com/office/powerpoint/2010/main" val="3596146395"/>
       </p:ext>
     </p:extLst>
   </p:cSld>
@@ -7519,8 +7490,8 @@
         </p:blipFill>
         <p:spPr>
           <a:xfrm>
-            <a:off x="426775" y="383588"/>
-            <a:ext cx="7883756" cy="3970237"/>
+            <a:off x="223064" y="196942"/>
+            <a:ext cx="8832362" cy="3710081"/>
           </a:xfrm>
           <a:prstGeom prst="rect">
             <a:avLst/>
@@ -7535,7 +7506,7 @@
         </p:nvSpPr>
         <p:spPr>
           <a:xfrm>
-            <a:off x="1971279" y="3295444"/>
+            <a:off x="1294840" y="1956287"/>
             <a:ext cx="179465" cy="248504"/>
           </a:xfrm>
           <a:prstGeom prst="star6">
@@ -7565,10 +7536,59 @@
           </a:p>
         </p:txBody>
       </p:sp>
+      <p:sp>
+        <p:nvSpPr>
+          <p:cNvPr id="4" name="TextBox 3"/>
+          <p:cNvSpPr txBox="1"/>
+          <p:nvPr/>
+        </p:nvSpPr>
+        <p:spPr>
+          <a:xfrm>
+            <a:off x="593611" y="4431641"/>
+            <a:ext cx="7979214" cy="1200329"/>
+          </a:xfrm>
+          <a:prstGeom prst="rect">
+            <a:avLst/>
+          </a:prstGeom>
+          <a:noFill/>
+        </p:spPr>
+        <p:txBody>
+          <a:bodyPr wrap="square" rtlCol="0">
+            <a:spAutoFit/>
+          </a:bodyPr>
+          <a:lstStyle/>
+          <a:p>
+            <a:r>
+              <a:rPr lang="en-US" dirty="0" err="1"/>
+              <a:t>Procs</a:t>
+            </a:r>
+            <a:r>
+              <a:rPr lang="en-US" dirty="0"/>
+              <a:t> in Ruby are drop in code snippets, not methods. Because of this, the </a:t>
+            </a:r>
+            <a:r>
+              <a:rPr lang="en-US" dirty="0" err="1"/>
+              <a:t>Proc</a:t>
+            </a:r>
+            <a:r>
+              <a:rPr lang="en-US" dirty="0"/>
+              <a:t> return is the </a:t>
+            </a:r>
+            <a:r>
+              <a:rPr lang="en-US" dirty="0" err="1"/>
+              <a:t>proc_return</a:t>
+            </a:r>
+            <a:r>
+              <a:rPr lang="en-US" dirty="0"/>
+              <a:t> method’s return, and acts accordingly. Lambdas however act just like methods, as they check the number of arguments and do not override the calling methods return.</a:t>
+            </a:r>
+          </a:p>
+        </p:txBody>
+      </p:sp>
     </p:spTree>
     <p:extLst>
       <p:ext uri="{BB962C8B-B14F-4D97-AF65-F5344CB8AC3E}">
-        <p14:creationId xmlns:p14="http://schemas.microsoft.com/office/powerpoint/2010/main" val="2137959266"/>
+        <p14:creationId xmlns:p14="http://schemas.microsoft.com/office/powerpoint/2010/main" val="3554166487"/>
       </p:ext>
     </p:extLst>
   </p:cSld>
@@ -7618,8 +7638,8 @@
         </p:blipFill>
         <p:spPr>
           <a:xfrm>
-            <a:off x="112624" y="184149"/>
-            <a:ext cx="8738474" cy="4081824"/>
+            <a:off x="426775" y="383588"/>
+            <a:ext cx="7883756" cy="3970237"/>
           </a:xfrm>
           <a:prstGeom prst="rect">
             <a:avLst/>
@@ -7634,7 +7654,7 @@
         </p:nvSpPr>
         <p:spPr>
           <a:xfrm>
-            <a:off x="1198206" y="2425682"/>
+            <a:off x="1971279" y="3295444"/>
             <a:ext cx="179465" cy="248504"/>
           </a:xfrm>
           <a:prstGeom prst="star6">
@@ -7667,7 +7687,7 @@
     </p:spTree>
     <p:extLst>
       <p:ext uri="{BB962C8B-B14F-4D97-AF65-F5344CB8AC3E}">
-        <p14:creationId xmlns:p14="http://schemas.microsoft.com/office/powerpoint/2010/main" val="2108686781"/>
+        <p14:creationId xmlns:p14="http://schemas.microsoft.com/office/powerpoint/2010/main" val="2137959266"/>
       </p:ext>
     </p:extLst>
   </p:cSld>
@@ -7717,8 +7737,8 @@
         </p:blipFill>
         <p:spPr>
           <a:xfrm>
-            <a:off x="248998" y="313453"/>
-            <a:ext cx="8744560" cy="3331261"/>
+            <a:off x="112624" y="184149"/>
+            <a:ext cx="8738474" cy="4081824"/>
           </a:xfrm>
           <a:prstGeom prst="rect">
             <a:avLst/>
@@ -7733,7 +7753,7 @@
         </p:nvSpPr>
         <p:spPr>
           <a:xfrm>
-            <a:off x="1529523" y="2674186"/>
+            <a:off x="1198206" y="2425682"/>
             <a:ext cx="179465" cy="248504"/>
           </a:xfrm>
           <a:prstGeom prst="star6">
@@ -7766,7 +7786,7 @@
     </p:spTree>
     <p:extLst>
       <p:ext uri="{BB962C8B-B14F-4D97-AF65-F5344CB8AC3E}">
-        <p14:creationId xmlns:p14="http://schemas.microsoft.com/office/powerpoint/2010/main" val="1016202084"/>
+        <p14:creationId xmlns:p14="http://schemas.microsoft.com/office/powerpoint/2010/main" val="2108686781"/>
       </p:ext>
     </p:extLst>
   </p:cSld>
@@ -7816,8 +7836,8 @@
         </p:blipFill>
         <p:spPr>
           <a:xfrm>
-            <a:off x="192673" y="96984"/>
-            <a:ext cx="8779775" cy="3492507"/>
+            <a:off x="248998" y="313453"/>
+            <a:ext cx="8744560" cy="3331261"/>
           </a:xfrm>
           <a:prstGeom prst="rect">
             <a:avLst/>
@@ -7832,7 +7852,7 @@
         </p:nvSpPr>
         <p:spPr>
           <a:xfrm>
-            <a:off x="1430071" y="2687992"/>
+            <a:off x="1529523" y="2674186"/>
             <a:ext cx="179465" cy="248504"/>
           </a:xfrm>
           <a:prstGeom prst="star6">
@@ -7865,7 +7885,7 @@
     </p:spTree>
     <p:extLst>
       <p:ext uri="{BB962C8B-B14F-4D97-AF65-F5344CB8AC3E}">
-        <p14:creationId xmlns:p14="http://schemas.microsoft.com/office/powerpoint/2010/main" val="1666997572"/>
+        <p14:creationId xmlns:p14="http://schemas.microsoft.com/office/powerpoint/2010/main" val="1016202084"/>
       </p:ext>
     </p:extLst>
   </p:cSld>
@@ -7915,8 +7935,8 @@
         </p:blipFill>
         <p:spPr>
           <a:xfrm>
-            <a:off x="177218" y="236147"/>
-            <a:ext cx="8874840" cy="3408567"/>
+            <a:off x="192673" y="96984"/>
+            <a:ext cx="8779775" cy="3492507"/>
           </a:xfrm>
           <a:prstGeom prst="rect">
             <a:avLst/>
@@ -7931,7 +7951,7 @@
         </p:nvSpPr>
         <p:spPr>
           <a:xfrm>
-            <a:off x="1519803" y="1362641"/>
+            <a:off x="1430071" y="2687992"/>
             <a:ext cx="179465" cy="248504"/>
           </a:xfrm>
           <a:prstGeom prst="star6">
@@ -7964,7 +7984,7 @@
     </p:spTree>
     <p:extLst>
       <p:ext uri="{BB962C8B-B14F-4D97-AF65-F5344CB8AC3E}">
-        <p14:creationId xmlns:p14="http://schemas.microsoft.com/office/powerpoint/2010/main" val="303287824"/>
+        <p14:creationId xmlns:p14="http://schemas.microsoft.com/office/powerpoint/2010/main" val="1666997572"/>
       </p:ext>
     </p:extLst>
   </p:cSld>
@@ -8000,7 +8020,7 @@
       </p:grpSpPr>
       <p:pic>
         <p:nvPicPr>
-          <p:cNvPr id="6" name="Picture 5"/>
+          <p:cNvPr id="2" name="Picture 1"/>
           <p:cNvPicPr>
             <a:picLocks noChangeAspect="1"/>
           </p:cNvPicPr>
@@ -8014,8 +8034,8 @@
         </p:blipFill>
         <p:spPr>
           <a:xfrm>
-            <a:off x="109275" y="180925"/>
-            <a:ext cx="8117700" cy="3781322"/>
+            <a:off x="177218" y="236147"/>
+            <a:ext cx="8874840" cy="3408567"/>
           </a:xfrm>
           <a:prstGeom prst="rect">
             <a:avLst/>
@@ -8030,7 +8050,7 @@
         </p:nvSpPr>
         <p:spPr>
           <a:xfrm>
-            <a:off x="1430071" y="920857"/>
+            <a:off x="1519803" y="1362641"/>
             <a:ext cx="179465" cy="248504"/>
           </a:xfrm>
           <a:prstGeom prst="star6">
@@ -8063,7 +8083,7 @@
     </p:spTree>
     <p:extLst>
       <p:ext uri="{BB962C8B-B14F-4D97-AF65-F5344CB8AC3E}">
-        <p14:creationId xmlns:p14="http://schemas.microsoft.com/office/powerpoint/2010/main" val="2093075471"/>
+        <p14:creationId xmlns:p14="http://schemas.microsoft.com/office/powerpoint/2010/main" val="303287824"/>
       </p:ext>
     </p:extLst>
   </p:cSld>
@@ -8099,7 +8119,7 @@
       </p:grpSpPr>
       <p:pic>
         <p:nvPicPr>
-          <p:cNvPr id="2" name="Picture 1"/>
+          <p:cNvPr id="6" name="Picture 5"/>
           <p:cNvPicPr>
             <a:picLocks noChangeAspect="1"/>
           </p:cNvPicPr>
@@ -8113,8 +8133,8 @@
         </p:blipFill>
         <p:spPr>
           <a:xfrm>
-            <a:off x="0" y="-1"/>
-            <a:ext cx="8960486" cy="3755161"/>
+            <a:off x="109275" y="180925"/>
+            <a:ext cx="8117700" cy="3781322"/>
           </a:xfrm>
           <a:prstGeom prst="rect">
             <a:avLst/>
@@ -8129,7 +8149,7 @@
         </p:nvSpPr>
         <p:spPr>
           <a:xfrm>
-            <a:off x="1250606" y="1956287"/>
+            <a:off x="1430071" y="920857"/>
             <a:ext cx="179465" cy="248504"/>
           </a:xfrm>
           <a:prstGeom prst="star6">
@@ -8162,7 +8182,7 @@
     </p:spTree>
     <p:extLst>
       <p:ext uri="{BB962C8B-B14F-4D97-AF65-F5344CB8AC3E}">
-        <p14:creationId xmlns:p14="http://schemas.microsoft.com/office/powerpoint/2010/main" val="1066416228"/>
+        <p14:creationId xmlns:p14="http://schemas.microsoft.com/office/powerpoint/2010/main" val="2093075471"/>
       </p:ext>
     </p:extLst>
   </p:cSld>
@@ -8212,8 +8232,8 @@
         </p:blipFill>
         <p:spPr>
           <a:xfrm>
-            <a:off x="173309" y="234697"/>
-            <a:ext cx="7889882" cy="4376419"/>
+            <a:off x="0" y="-1"/>
+            <a:ext cx="8960486" cy="3755161"/>
           </a:xfrm>
           <a:prstGeom prst="rect">
             <a:avLst/>
@@ -8228,7 +8248,7 @@
         </p:nvSpPr>
         <p:spPr>
           <a:xfrm>
-            <a:off x="1885630" y="2218597"/>
+            <a:off x="1250606" y="1956287"/>
             <a:ext cx="179465" cy="248504"/>
           </a:xfrm>
           <a:prstGeom prst="star6">
@@ -8261,7 +8281,7 @@
     </p:spTree>
     <p:extLst>
       <p:ext uri="{BB962C8B-B14F-4D97-AF65-F5344CB8AC3E}">
-        <p14:creationId xmlns:p14="http://schemas.microsoft.com/office/powerpoint/2010/main" val="4026942776"/>
+        <p14:creationId xmlns:p14="http://schemas.microsoft.com/office/powerpoint/2010/main" val="1066416228"/>
       </p:ext>
     </p:extLst>
   </p:cSld>
@@ -8297,7 +8317,7 @@
       </p:grpSpPr>
       <p:pic>
         <p:nvPicPr>
-          <p:cNvPr id="3" name="Picture 2"/>
+          <p:cNvPr id="2" name="Picture 1"/>
           <p:cNvPicPr>
             <a:picLocks noChangeAspect="1"/>
           </p:cNvPicPr>
@@ -8311,18 +8331,56 @@
         </p:blipFill>
         <p:spPr>
           <a:xfrm>
-            <a:off x="211468" y="305176"/>
-            <a:ext cx="8824907" cy="3063423"/>
+            <a:off x="173309" y="234697"/>
+            <a:ext cx="7889882" cy="4376419"/>
           </a:xfrm>
           <a:prstGeom prst="rect">
             <a:avLst/>
           </a:prstGeom>
         </p:spPr>
       </p:pic>
+      <p:sp>
+        <p:nvSpPr>
+          <p:cNvPr id="3" name="6-Point Star 2"/>
+          <p:cNvSpPr/>
+          <p:nvPr/>
+        </p:nvSpPr>
+        <p:spPr>
+          <a:xfrm>
+            <a:off x="1885630" y="2218597"/>
+            <a:ext cx="179465" cy="248504"/>
+          </a:xfrm>
+          <a:prstGeom prst="star6">
+            <a:avLst/>
+          </a:prstGeom>
+        </p:spPr>
+        <p:style>
+          <a:lnRef idx="1">
+            <a:schemeClr val="accent1"/>
+          </a:lnRef>
+          <a:fillRef idx="3">
+            <a:schemeClr val="accent1"/>
+          </a:fillRef>
+          <a:effectRef idx="2">
+            <a:schemeClr val="accent1"/>
+          </a:effectRef>
+          <a:fontRef idx="minor">
+            <a:schemeClr val="lt1"/>
+          </a:fontRef>
+        </p:style>
+        <p:txBody>
+          <a:bodyPr rtlCol="0" anchor="ctr"/>
+          <a:lstStyle/>
+          <a:p>
+            <a:pPr algn="ctr"/>
+            <a:endParaRPr lang="en-US"/>
+          </a:p>
+        </p:txBody>
+      </p:sp>
     </p:spTree>
     <p:extLst>
       <p:ext uri="{BB962C8B-B14F-4D97-AF65-F5344CB8AC3E}">
-        <p14:creationId xmlns:p14="http://schemas.microsoft.com/office/powerpoint/2010/main" val="4060399918"/>
+        <p14:creationId xmlns:p14="http://schemas.microsoft.com/office/powerpoint/2010/main" val="4026942776"/>
       </p:ext>
     </p:extLst>
   </p:cSld>
@@ -8380,6 +8438,36 @@
           </a:prstGeom>
         </p:spPr>
       </p:pic>
+      <p:sp>
+        <p:nvSpPr>
+          <p:cNvPr id="2" name="TextBox 1"/>
+          <p:cNvSpPr txBox="1"/>
+          <p:nvPr/>
+        </p:nvSpPr>
+        <p:spPr>
+          <a:xfrm>
+            <a:off x="2125950" y="814539"/>
+            <a:ext cx="1800042" cy="369332"/>
+          </a:xfrm>
+          <a:prstGeom prst="rect">
+            <a:avLst/>
+          </a:prstGeom>
+          <a:noFill/>
+        </p:spPr>
+        <p:txBody>
+          <a:bodyPr wrap="none" rtlCol="0">
+            <a:spAutoFit/>
+          </a:bodyPr>
+          <a:lstStyle/>
+          <a:p>
+            <a:r>
+              <a:rPr lang="en-US" dirty="0" smtClean="0"/>
+              <a:t>Regex Nightmare</a:t>
+            </a:r>
+            <a:endParaRPr lang="en-US" dirty="0"/>
+          </a:p>
+        </p:txBody>
+      </p:sp>
     </p:spTree>
     <p:extLst>
       <p:ext uri="{BB962C8B-B14F-4D97-AF65-F5344CB8AC3E}">
@@ -8412,7 +8500,7 @@
       </p:grpSpPr>
       <p:pic>
         <p:nvPicPr>
-          <p:cNvPr id="2" name="Picture 1"/>
+          <p:cNvPr id="3" name="Picture 2"/>
           <p:cNvPicPr>
             <a:picLocks noChangeAspect="1"/>
           </p:cNvPicPr>
@@ -8426,56 +8514,18 @@
         </p:blipFill>
         <p:spPr>
           <a:xfrm>
-            <a:off x="320801" y="184242"/>
-            <a:ext cx="8821975" cy="3156745"/>
+            <a:off x="211468" y="305176"/>
+            <a:ext cx="8824907" cy="3063423"/>
           </a:xfrm>
           <a:prstGeom prst="rect">
             <a:avLst/>
           </a:prstGeom>
         </p:spPr>
       </p:pic>
-      <p:sp>
-        <p:nvSpPr>
-          <p:cNvPr id="3" name="6-Point Star 2"/>
-          <p:cNvSpPr/>
-          <p:nvPr/>
-        </p:nvSpPr>
-        <p:spPr>
-          <a:xfrm>
-            <a:off x="1443874" y="865634"/>
-            <a:ext cx="179465" cy="248504"/>
-          </a:xfrm>
-          <a:prstGeom prst="star6">
-            <a:avLst/>
-          </a:prstGeom>
-        </p:spPr>
-        <p:style>
-          <a:lnRef idx="1">
-            <a:schemeClr val="accent1"/>
-          </a:lnRef>
-          <a:fillRef idx="3">
-            <a:schemeClr val="accent1"/>
-          </a:fillRef>
-          <a:effectRef idx="2">
-            <a:schemeClr val="accent1"/>
-          </a:effectRef>
-          <a:fontRef idx="minor">
-            <a:schemeClr val="lt1"/>
-          </a:fontRef>
-        </p:style>
-        <p:txBody>
-          <a:bodyPr rtlCol="0" anchor="ctr"/>
-          <a:lstStyle/>
-          <a:p>
-            <a:pPr algn="ctr"/>
-            <a:endParaRPr lang="en-US"/>
-          </a:p>
-        </p:txBody>
-      </p:sp>
     </p:spTree>
     <p:extLst>
       <p:ext uri="{BB962C8B-B14F-4D97-AF65-F5344CB8AC3E}">
-        <p14:creationId xmlns:p14="http://schemas.microsoft.com/office/powerpoint/2010/main" val="3167831915"/>
+        <p14:creationId xmlns:p14="http://schemas.microsoft.com/office/powerpoint/2010/main" val="4060399918"/>
       </p:ext>
     </p:extLst>
   </p:cSld>
@@ -8525,8 +8575,8 @@
         </p:blipFill>
         <p:spPr>
           <a:xfrm>
-            <a:off x="140793" y="274816"/>
-            <a:ext cx="8963476" cy="3273257"/>
+            <a:off x="320801" y="184242"/>
+            <a:ext cx="8821975" cy="3156745"/>
           </a:xfrm>
           <a:prstGeom prst="rect">
             <a:avLst/>
@@ -8541,7 +8591,7 @@
         </p:nvSpPr>
         <p:spPr>
           <a:xfrm>
-            <a:off x="1354141" y="2356654"/>
+            <a:off x="1443874" y="865634"/>
             <a:ext cx="179465" cy="248504"/>
           </a:xfrm>
           <a:prstGeom prst="star6">
@@ -8574,7 +8624,7 @@
     </p:spTree>
     <p:extLst>
       <p:ext uri="{BB962C8B-B14F-4D97-AF65-F5344CB8AC3E}">
-        <p14:creationId xmlns:p14="http://schemas.microsoft.com/office/powerpoint/2010/main" val="2694190945"/>
+        <p14:creationId xmlns:p14="http://schemas.microsoft.com/office/powerpoint/2010/main" val="3167831915"/>
       </p:ext>
     </p:extLst>
   </p:cSld>
@@ -8624,8 +8674,8 @@
         </p:blipFill>
         <p:spPr>
           <a:xfrm>
-            <a:off x="231320" y="239498"/>
-            <a:ext cx="8037796" cy="4269102"/>
+            <a:off x="140793" y="274816"/>
+            <a:ext cx="8963476" cy="3273257"/>
           </a:xfrm>
           <a:prstGeom prst="rect">
             <a:avLst/>
@@ -8640,7 +8690,7 @@
         </p:nvSpPr>
         <p:spPr>
           <a:xfrm>
-            <a:off x="1533606" y="3502531"/>
+            <a:off x="1354141" y="2356654"/>
             <a:ext cx="179465" cy="248504"/>
           </a:xfrm>
           <a:prstGeom prst="star6">
@@ -8673,7 +8723,7 @@
     </p:spTree>
     <p:extLst>
       <p:ext uri="{BB962C8B-B14F-4D97-AF65-F5344CB8AC3E}">
-        <p14:creationId xmlns:p14="http://schemas.microsoft.com/office/powerpoint/2010/main" val="630815686"/>
+        <p14:creationId xmlns:p14="http://schemas.microsoft.com/office/powerpoint/2010/main" val="2694190945"/>
       </p:ext>
     </p:extLst>
   </p:cSld>
@@ -8723,8 +8773,8 @@
         </p:blipFill>
         <p:spPr>
           <a:xfrm>
-            <a:off x="113729" y="236717"/>
-            <a:ext cx="9013984" cy="3504637"/>
+            <a:off x="231320" y="239498"/>
+            <a:ext cx="8037796" cy="4269102"/>
           </a:xfrm>
           <a:prstGeom prst="rect">
             <a:avLst/>
@@ -8739,7 +8789,7 @@
         </p:nvSpPr>
         <p:spPr>
           <a:xfrm>
-            <a:off x="1271311" y="2433928"/>
+            <a:off x="1533606" y="3502531"/>
             <a:ext cx="179465" cy="248504"/>
           </a:xfrm>
           <a:prstGeom prst="star6">
@@ -8772,7 +8822,7 @@
     </p:spTree>
     <p:extLst>
       <p:ext uri="{BB962C8B-B14F-4D97-AF65-F5344CB8AC3E}">
-        <p14:creationId xmlns:p14="http://schemas.microsoft.com/office/powerpoint/2010/main" val="2578632978"/>
+        <p14:creationId xmlns:p14="http://schemas.microsoft.com/office/powerpoint/2010/main" val="630815686"/>
       </p:ext>
     </p:extLst>
   </p:cSld>
@@ -8822,8 +8872,8 @@
         </p:blipFill>
         <p:spPr>
           <a:xfrm>
-            <a:off x="-1" y="251060"/>
-            <a:ext cx="8358335" cy="3766410"/>
+            <a:off x="113729" y="236717"/>
+            <a:ext cx="9013984" cy="3504637"/>
           </a:xfrm>
           <a:prstGeom prst="rect">
             <a:avLst/>
@@ -8838,7 +8888,7 @@
         </p:nvSpPr>
         <p:spPr>
           <a:xfrm>
-            <a:off x="1554309" y="2950301"/>
+            <a:off x="1271311" y="2433928"/>
             <a:ext cx="179465" cy="248504"/>
           </a:xfrm>
           <a:prstGeom prst="star6">
@@ -8871,7 +8921,7 @@
     </p:spTree>
     <p:extLst>
       <p:ext uri="{BB962C8B-B14F-4D97-AF65-F5344CB8AC3E}">
-        <p14:creationId xmlns:p14="http://schemas.microsoft.com/office/powerpoint/2010/main" val="2435855959"/>
+        <p14:creationId xmlns:p14="http://schemas.microsoft.com/office/powerpoint/2010/main" val="2578632978"/>
       </p:ext>
     </p:extLst>
   </p:cSld>
@@ -8921,8 +8971,8 @@
         </p:blipFill>
         <p:spPr>
           <a:xfrm>
-            <a:off x="-1" y="239465"/>
-            <a:ext cx="9144651" cy="3156745"/>
+            <a:off x="-1" y="251060"/>
+            <a:ext cx="8358335" cy="3766410"/>
           </a:xfrm>
           <a:prstGeom prst="rect">
             <a:avLst/>
@@ -8937,7 +8987,7 @@
         </p:nvSpPr>
         <p:spPr>
           <a:xfrm>
-            <a:off x="1209187" y="1348835"/>
+            <a:off x="1554309" y="2950301"/>
             <a:ext cx="179465" cy="248504"/>
           </a:xfrm>
           <a:prstGeom prst="star6">
@@ -8970,7 +9020,7 @@
     </p:spTree>
     <p:extLst>
       <p:ext uri="{BB962C8B-B14F-4D97-AF65-F5344CB8AC3E}">
-        <p14:creationId xmlns:p14="http://schemas.microsoft.com/office/powerpoint/2010/main" val="94628591"/>
+        <p14:creationId xmlns:p14="http://schemas.microsoft.com/office/powerpoint/2010/main" val="2435855959"/>
       </p:ext>
     </p:extLst>
   </p:cSld>
@@ -9020,18 +9070,56 @@
         </p:blipFill>
         <p:spPr>
           <a:xfrm>
-            <a:off x="100189" y="170745"/>
-            <a:ext cx="8932828" cy="3526366"/>
+            <a:off x="-1" y="239465"/>
+            <a:ext cx="9144651" cy="3156745"/>
           </a:xfrm>
           <a:prstGeom prst="rect">
             <a:avLst/>
           </a:prstGeom>
         </p:spPr>
       </p:pic>
+      <p:sp>
+        <p:nvSpPr>
+          <p:cNvPr id="3" name="6-Point Star 2"/>
+          <p:cNvSpPr/>
+          <p:nvPr/>
+        </p:nvSpPr>
+        <p:spPr>
+          <a:xfrm>
+            <a:off x="1209187" y="1348835"/>
+            <a:ext cx="179465" cy="248504"/>
+          </a:xfrm>
+          <a:prstGeom prst="star6">
+            <a:avLst/>
+          </a:prstGeom>
+        </p:spPr>
+        <p:style>
+          <a:lnRef idx="1">
+            <a:schemeClr val="accent1"/>
+          </a:lnRef>
+          <a:fillRef idx="3">
+            <a:schemeClr val="accent1"/>
+          </a:fillRef>
+          <a:effectRef idx="2">
+            <a:schemeClr val="accent1"/>
+          </a:effectRef>
+          <a:fontRef idx="minor">
+            <a:schemeClr val="lt1"/>
+          </a:fontRef>
+        </p:style>
+        <p:txBody>
+          <a:bodyPr rtlCol="0" anchor="ctr"/>
+          <a:lstStyle/>
+          <a:p>
+            <a:pPr algn="ctr"/>
+            <a:endParaRPr lang="en-US"/>
+          </a:p>
+        </p:txBody>
+      </p:sp>
     </p:spTree>
     <p:extLst>
       <p:ext uri="{BB962C8B-B14F-4D97-AF65-F5344CB8AC3E}">
-        <p14:creationId xmlns:p14="http://schemas.microsoft.com/office/powerpoint/2010/main" val="1496999273"/>
+        <p14:creationId xmlns:p14="http://schemas.microsoft.com/office/powerpoint/2010/main" val="94628591"/>
       </p:ext>
     </p:extLst>
   </p:cSld>
@@ -9081,56 +9169,18 @@
         </p:blipFill>
         <p:spPr>
           <a:xfrm>
-            <a:off x="294922" y="253999"/>
-            <a:ext cx="8503531" cy="4106333"/>
+            <a:off x="100189" y="170745"/>
+            <a:ext cx="8932828" cy="3526366"/>
           </a:xfrm>
           <a:prstGeom prst="rect">
             <a:avLst/>
           </a:prstGeom>
         </p:spPr>
       </p:pic>
-      <p:sp>
-        <p:nvSpPr>
-          <p:cNvPr id="3" name="6-Point Star 2"/>
-          <p:cNvSpPr/>
-          <p:nvPr/>
-        </p:nvSpPr>
-        <p:spPr>
-          <a:xfrm>
-            <a:off x="1594554" y="2850444"/>
-            <a:ext cx="237067" cy="279400"/>
-          </a:xfrm>
-          <a:prstGeom prst="star6">
-            <a:avLst/>
-          </a:prstGeom>
-        </p:spPr>
-        <p:style>
-          <a:lnRef idx="1">
-            <a:schemeClr val="accent1"/>
-          </a:lnRef>
-          <a:fillRef idx="3">
-            <a:schemeClr val="accent1"/>
-          </a:fillRef>
-          <a:effectRef idx="2">
-            <a:schemeClr val="accent1"/>
-          </a:effectRef>
-          <a:fontRef idx="minor">
-            <a:schemeClr val="lt1"/>
-          </a:fontRef>
-        </p:style>
-        <p:txBody>
-          <a:bodyPr rtlCol="0" anchor="ctr"/>
-          <a:lstStyle/>
-          <a:p>
-            <a:pPr algn="ctr"/>
-            <a:endParaRPr lang="en-US"/>
-          </a:p>
-        </p:txBody>
-      </p:sp>
     </p:spTree>
     <p:extLst>
       <p:ext uri="{BB962C8B-B14F-4D97-AF65-F5344CB8AC3E}">
-        <p14:creationId xmlns:p14="http://schemas.microsoft.com/office/powerpoint/2010/main" val="3948771529"/>
+        <p14:creationId xmlns:p14="http://schemas.microsoft.com/office/powerpoint/2010/main" val="1496999273"/>
       </p:ext>
     </p:extLst>
   </p:cSld>
@@ -9180,8 +9230,8 @@
         </p:blipFill>
         <p:spPr>
           <a:xfrm>
-            <a:off x="246944" y="211667"/>
-            <a:ext cx="9006736" cy="3358444"/>
+            <a:off x="294922" y="253999"/>
+            <a:ext cx="8503531" cy="4106333"/>
           </a:xfrm>
           <a:prstGeom prst="rect">
             <a:avLst/>
@@ -9190,13 +9240,13 @@
       </p:pic>
       <p:sp>
         <p:nvSpPr>
-          <p:cNvPr id="4" name="6-Point Star 3"/>
+          <p:cNvPr id="3" name="6-Point Star 2"/>
           <p:cNvSpPr/>
           <p:nvPr/>
         </p:nvSpPr>
         <p:spPr>
           <a:xfrm>
-            <a:off x="1394175" y="1761067"/>
+            <a:off x="1594554" y="2850444"/>
             <a:ext cx="237067" cy="279400"/>
           </a:xfrm>
           <a:prstGeom prst="star6">
@@ -9229,7 +9279,7 @@
     </p:spTree>
     <p:extLst>
       <p:ext uri="{BB962C8B-B14F-4D97-AF65-F5344CB8AC3E}">
-        <p14:creationId xmlns:p14="http://schemas.microsoft.com/office/powerpoint/2010/main" val="2216329371"/>
+        <p14:creationId xmlns:p14="http://schemas.microsoft.com/office/powerpoint/2010/main" val="3948771529"/>
       </p:ext>
     </p:extLst>
   </p:cSld>
@@ -9279,8 +9329,8 @@
         </p:blipFill>
         <p:spPr>
           <a:xfrm>
-            <a:off x="148166" y="279400"/>
-            <a:ext cx="8785331" cy="3728156"/>
+            <a:off x="246944" y="211667"/>
+            <a:ext cx="9006736" cy="3358444"/>
           </a:xfrm>
           <a:prstGeom prst="rect">
             <a:avLst/>
@@ -9289,13 +9339,13 @@
       </p:pic>
       <p:sp>
         <p:nvSpPr>
-          <p:cNvPr id="3" name="6-Point Star 2"/>
+          <p:cNvPr id="4" name="6-Point Star 3"/>
           <p:cNvSpPr/>
           <p:nvPr/>
         </p:nvSpPr>
         <p:spPr>
           <a:xfrm>
-            <a:off x="1707443" y="987778"/>
+            <a:off x="1394175" y="1761067"/>
             <a:ext cx="237067" cy="279400"/>
           </a:xfrm>
           <a:prstGeom prst="star6">
@@ -9328,7 +9378,7 @@
     </p:spTree>
     <p:extLst>
       <p:ext uri="{BB962C8B-B14F-4D97-AF65-F5344CB8AC3E}">
-        <p14:creationId xmlns:p14="http://schemas.microsoft.com/office/powerpoint/2010/main" val="3672076736"/>
+        <p14:creationId xmlns:p14="http://schemas.microsoft.com/office/powerpoint/2010/main" val="2216329371"/>
       </p:ext>
     </p:extLst>
   </p:cSld>
@@ -9432,8 +9482,8 @@
         </p:blipFill>
         <p:spPr>
           <a:xfrm>
-            <a:off x="335845" y="189088"/>
-            <a:ext cx="8492554" cy="3423355"/>
+            <a:off x="148166" y="279400"/>
+            <a:ext cx="8785331" cy="3728156"/>
           </a:xfrm>
           <a:prstGeom prst="rect">
             <a:avLst/>
@@ -9448,7 +9498,7 @@
         </p:nvSpPr>
         <p:spPr>
           <a:xfrm>
-            <a:off x="1574798" y="1778001"/>
+            <a:off x="1707443" y="987778"/>
             <a:ext cx="237067" cy="279400"/>
           </a:xfrm>
           <a:prstGeom prst="star6">
@@ -9481,7 +9531,7 @@
     </p:spTree>
     <p:extLst>
       <p:ext uri="{BB962C8B-B14F-4D97-AF65-F5344CB8AC3E}">
-        <p14:creationId xmlns:p14="http://schemas.microsoft.com/office/powerpoint/2010/main" val="2546375304"/>
+        <p14:creationId xmlns:p14="http://schemas.microsoft.com/office/powerpoint/2010/main" val="3672076736"/>
       </p:ext>
     </p:extLst>
   </p:cSld>
@@ -9531,18 +9581,56 @@
         </p:blipFill>
         <p:spPr>
           <a:xfrm>
-            <a:off x="292099" y="186267"/>
-            <a:ext cx="8600007" cy="3228622"/>
+            <a:off x="335845" y="189088"/>
+            <a:ext cx="8492554" cy="3423355"/>
           </a:xfrm>
           <a:prstGeom prst="rect">
             <a:avLst/>
           </a:prstGeom>
         </p:spPr>
       </p:pic>
+      <p:sp>
+        <p:nvSpPr>
+          <p:cNvPr id="3" name="6-Point Star 2"/>
+          <p:cNvSpPr/>
+          <p:nvPr/>
+        </p:nvSpPr>
+        <p:spPr>
+          <a:xfrm>
+            <a:off x="1574798" y="1778001"/>
+            <a:ext cx="237067" cy="279400"/>
+          </a:xfrm>
+          <a:prstGeom prst="star6">
+            <a:avLst/>
+          </a:prstGeom>
+        </p:spPr>
+        <p:style>
+          <a:lnRef idx="1">
+            <a:schemeClr val="accent1"/>
+          </a:lnRef>
+          <a:fillRef idx="3">
+            <a:schemeClr val="accent1"/>
+          </a:fillRef>
+          <a:effectRef idx="2">
+            <a:schemeClr val="accent1"/>
+          </a:effectRef>
+          <a:fontRef idx="minor">
+            <a:schemeClr val="lt1"/>
+          </a:fontRef>
+        </p:style>
+        <p:txBody>
+          <a:bodyPr rtlCol="0" anchor="ctr"/>
+          <a:lstStyle/>
+          <a:p>
+            <a:pPr algn="ctr"/>
+            <a:endParaRPr lang="en-US"/>
+          </a:p>
+        </p:txBody>
+      </p:sp>
     </p:spTree>
     <p:extLst>
       <p:ext uri="{BB962C8B-B14F-4D97-AF65-F5344CB8AC3E}">
-        <p14:creationId xmlns:p14="http://schemas.microsoft.com/office/powerpoint/2010/main" val="3553745136"/>
+        <p14:creationId xmlns:p14="http://schemas.microsoft.com/office/powerpoint/2010/main" val="2546375304"/>
       </p:ext>
     </p:extLst>
   </p:cSld>
@@ -9592,62 +9680,31 @@
         </p:blipFill>
         <p:spPr>
           <a:xfrm>
-            <a:off x="252588" y="321734"/>
-            <a:ext cx="8850461" cy="3079044"/>
+            <a:off x="292099" y="186267"/>
+            <a:ext cx="8600007" cy="3228622"/>
           </a:xfrm>
           <a:prstGeom prst="rect">
             <a:avLst/>
           </a:prstGeom>
         </p:spPr>
       </p:pic>
-      <p:sp>
-        <p:nvSpPr>
-          <p:cNvPr id="3" name="6-Point Star 2"/>
-          <p:cNvSpPr/>
-          <p:nvPr/>
-        </p:nvSpPr>
-        <p:spPr>
-          <a:xfrm>
-            <a:off x="1456265" y="2441222"/>
-            <a:ext cx="237067" cy="279400"/>
-          </a:xfrm>
-          <a:prstGeom prst="star6">
-            <a:avLst/>
-          </a:prstGeom>
-        </p:spPr>
-        <p:style>
-          <a:lnRef idx="1">
-            <a:schemeClr val="accent1"/>
-          </a:lnRef>
-          <a:fillRef idx="3">
-            <a:schemeClr val="accent1"/>
-          </a:fillRef>
-          <a:effectRef idx="2">
-            <a:schemeClr val="accent1"/>
-          </a:effectRef>
-          <a:fontRef idx="minor">
-            <a:schemeClr val="lt1"/>
-          </a:fontRef>
-        </p:style>
-        <p:txBody>
-          <a:bodyPr rtlCol="0" anchor="ctr"/>
-          <a:lstStyle/>
-          <a:p>
-            <a:pPr algn="ctr"/>
-            <a:endParaRPr lang="en-US"/>
-          </a:p>
-        </p:txBody>
-      </p:sp>
     </p:spTree>
     <p:extLst>
       <p:ext uri="{BB962C8B-B14F-4D97-AF65-F5344CB8AC3E}">
-        <p14:creationId xmlns:p14="http://schemas.microsoft.com/office/powerpoint/2010/main" val="1306211906"/>
+        <p14:creationId xmlns:p14="http://schemas.microsoft.com/office/powerpoint/2010/main" val="3553745136"/>
       </p:ext>
     </p:extLst>
   </p:cSld>
   <p:clrMapOvr>
     <a:masterClrMapping/>
   </p:clrMapOvr>
+  <p:timing>
+    <p:tnLst>
+      <p:par>
+        <p:cTn xmlns:p14="http://schemas.microsoft.com/office/powerpoint/2010/main" id="1" dur="indefinite" restart="never" nodeType="tmRoot"/>
+      </p:par>
+    </p:tnLst>
+  </p:timing>
 </p:sld>
 </file>
 
@@ -9670,7 +9727,7 @@
       </p:grpSpPr>
       <p:pic>
         <p:nvPicPr>
-          <p:cNvPr id="3" name="Picture 2"/>
+          <p:cNvPr id="2" name="Picture 1"/>
           <p:cNvPicPr>
             <a:picLocks noChangeAspect="1"/>
           </p:cNvPicPr>
@@ -9684,18 +9741,56 @@
         </p:blipFill>
         <p:spPr>
           <a:xfrm>
-            <a:off x="-1" y="-1"/>
-            <a:ext cx="8778411" cy="4205111"/>
+            <a:off x="252588" y="321734"/>
+            <a:ext cx="8850461" cy="3079044"/>
           </a:xfrm>
           <a:prstGeom prst="rect">
             <a:avLst/>
           </a:prstGeom>
         </p:spPr>
       </p:pic>
+      <p:sp>
+        <p:nvSpPr>
+          <p:cNvPr id="3" name="6-Point Star 2"/>
+          <p:cNvSpPr/>
+          <p:nvPr/>
+        </p:nvSpPr>
+        <p:spPr>
+          <a:xfrm>
+            <a:off x="1456265" y="2441222"/>
+            <a:ext cx="237067" cy="279400"/>
+          </a:xfrm>
+          <a:prstGeom prst="star6">
+            <a:avLst/>
+          </a:prstGeom>
+        </p:spPr>
+        <p:style>
+          <a:lnRef idx="1">
+            <a:schemeClr val="accent1"/>
+          </a:lnRef>
+          <a:fillRef idx="3">
+            <a:schemeClr val="accent1"/>
+          </a:fillRef>
+          <a:effectRef idx="2">
+            <a:schemeClr val="accent1"/>
+          </a:effectRef>
+          <a:fontRef idx="minor">
+            <a:schemeClr val="lt1"/>
+          </a:fontRef>
+        </p:style>
+        <p:txBody>
+          <a:bodyPr rtlCol="0" anchor="ctr"/>
+          <a:lstStyle/>
+          <a:p>
+            <a:pPr algn="ctr"/>
+            <a:endParaRPr lang="en-US"/>
+          </a:p>
+        </p:txBody>
+      </p:sp>
     </p:spTree>
     <p:extLst>
       <p:ext uri="{BB962C8B-B14F-4D97-AF65-F5344CB8AC3E}">
-        <p14:creationId xmlns:p14="http://schemas.microsoft.com/office/powerpoint/2010/main" val="2565234910"/>
+        <p14:creationId xmlns:p14="http://schemas.microsoft.com/office/powerpoint/2010/main" val="1306211906"/>
       </p:ext>
     </p:extLst>
   </p:cSld>
@@ -9724,7 +9819,7 @@
       </p:grpSpPr>
       <p:pic>
         <p:nvPicPr>
-          <p:cNvPr id="2" name="Picture 1"/>
+          <p:cNvPr id="3" name="Picture 2"/>
           <p:cNvPicPr>
             <a:picLocks noChangeAspect="1"/>
           </p:cNvPicPr>
@@ -9739,55 +9834,17 @@
         <p:spPr>
           <a:xfrm>
             <a:off x="-1" y="-1"/>
-            <a:ext cx="9144165" cy="4656667"/>
+            <a:ext cx="8778411" cy="4205111"/>
           </a:xfrm>
           <a:prstGeom prst="rect">
             <a:avLst/>
           </a:prstGeom>
         </p:spPr>
       </p:pic>
-      <p:sp>
-        <p:nvSpPr>
-          <p:cNvPr id="3" name="6-Point Star 2"/>
-          <p:cNvSpPr/>
-          <p:nvPr/>
-        </p:nvSpPr>
-        <p:spPr>
-          <a:xfrm>
-            <a:off x="1072443" y="3527777"/>
-            <a:ext cx="237067" cy="279400"/>
-          </a:xfrm>
-          <a:prstGeom prst="star6">
-            <a:avLst/>
-          </a:prstGeom>
-        </p:spPr>
-        <p:style>
-          <a:lnRef idx="1">
-            <a:schemeClr val="accent1"/>
-          </a:lnRef>
-          <a:fillRef idx="3">
-            <a:schemeClr val="accent1"/>
-          </a:fillRef>
-          <a:effectRef idx="2">
-            <a:schemeClr val="accent1"/>
-          </a:effectRef>
-          <a:fontRef idx="minor">
-            <a:schemeClr val="lt1"/>
-          </a:fontRef>
-        </p:style>
-        <p:txBody>
-          <a:bodyPr rtlCol="0" anchor="ctr"/>
-          <a:lstStyle/>
-          <a:p>
-            <a:pPr algn="ctr"/>
-            <a:endParaRPr lang="en-US"/>
-          </a:p>
-        </p:txBody>
-      </p:sp>
     </p:spTree>
     <p:extLst>
       <p:ext uri="{BB962C8B-B14F-4D97-AF65-F5344CB8AC3E}">
-        <p14:creationId xmlns:p14="http://schemas.microsoft.com/office/powerpoint/2010/main" val="1937321876"/>
+        <p14:creationId xmlns:p14="http://schemas.microsoft.com/office/powerpoint/2010/main" val="2565234910"/>
       </p:ext>
     </p:extLst>
   </p:cSld>
@@ -9830,8 +9887,8 @@
         </p:blipFill>
         <p:spPr>
           <a:xfrm>
-            <a:off x="232833" y="227188"/>
-            <a:ext cx="8501540" cy="4034367"/>
+            <a:off x="-1" y="-1"/>
+            <a:ext cx="9144165" cy="4656667"/>
           </a:xfrm>
           <a:prstGeom prst="rect">
             <a:avLst/>
@@ -9846,7 +9903,7 @@
         </p:nvSpPr>
         <p:spPr>
           <a:xfrm>
-            <a:off x="1439332" y="2483555"/>
+            <a:off x="1072443" y="3527777"/>
             <a:ext cx="237067" cy="279400"/>
           </a:xfrm>
           <a:prstGeom prst="star6">
@@ -9879,7 +9936,7 @@
     </p:spTree>
     <p:extLst>
       <p:ext uri="{BB962C8B-B14F-4D97-AF65-F5344CB8AC3E}">
-        <p14:creationId xmlns:p14="http://schemas.microsoft.com/office/powerpoint/2010/main" val="1853532550"/>
+        <p14:creationId xmlns:p14="http://schemas.microsoft.com/office/powerpoint/2010/main" val="1937321876"/>
       </p:ext>
     </p:extLst>
   </p:cSld>
@@ -9922,8 +9979,8 @@
         </p:blipFill>
         <p:spPr>
           <a:xfrm>
-            <a:off x="98778" y="-1"/>
-            <a:ext cx="8288788" cy="4021667"/>
+            <a:off x="232833" y="227188"/>
+            <a:ext cx="8501540" cy="4034367"/>
           </a:xfrm>
           <a:prstGeom prst="rect">
             <a:avLst/>
@@ -9938,7 +9995,7 @@
         </p:nvSpPr>
         <p:spPr>
           <a:xfrm>
-            <a:off x="1557865" y="1298221"/>
+            <a:off x="1439332" y="2483555"/>
             <a:ext cx="237067" cy="279400"/>
           </a:xfrm>
           <a:prstGeom prst="star6">
@@ -9971,7 +10028,7 @@
     </p:spTree>
     <p:extLst>
       <p:ext uri="{BB962C8B-B14F-4D97-AF65-F5344CB8AC3E}">
-        <p14:creationId xmlns:p14="http://schemas.microsoft.com/office/powerpoint/2010/main" val="2198373521"/>
+        <p14:creationId xmlns:p14="http://schemas.microsoft.com/office/powerpoint/2010/main" val="1853532550"/>
       </p:ext>
     </p:extLst>
   </p:cSld>
@@ -10000,7 +10057,7 @@
       </p:grpSpPr>
       <p:pic>
         <p:nvPicPr>
-          <p:cNvPr id="3" name="Picture 2"/>
+          <p:cNvPr id="2" name="Picture 1"/>
           <p:cNvPicPr>
             <a:picLocks noChangeAspect="1"/>
           </p:cNvPicPr>
@@ -10014,8 +10071,8 @@
         </p:blipFill>
         <p:spPr>
           <a:xfrm>
-            <a:off x="176389" y="177799"/>
-            <a:ext cx="8746496" cy="3801533"/>
+            <a:off x="98778" y="-1"/>
+            <a:ext cx="8288788" cy="4021667"/>
           </a:xfrm>
           <a:prstGeom prst="rect">
             <a:avLst/>
@@ -10024,13 +10081,13 @@
       </p:pic>
       <p:sp>
         <p:nvSpPr>
-          <p:cNvPr id="4" name="6-Point Star 3"/>
+          <p:cNvPr id="3" name="6-Point Star 2"/>
           <p:cNvSpPr/>
           <p:nvPr/>
         </p:nvSpPr>
         <p:spPr>
           <a:xfrm>
-            <a:off x="1439332" y="2271888"/>
+            <a:off x="1557865" y="1298221"/>
             <a:ext cx="237067" cy="279400"/>
           </a:xfrm>
           <a:prstGeom prst="star6">
@@ -10063,7 +10120,7 @@
     </p:spTree>
     <p:extLst>
       <p:ext uri="{BB962C8B-B14F-4D97-AF65-F5344CB8AC3E}">
-        <p14:creationId xmlns:p14="http://schemas.microsoft.com/office/powerpoint/2010/main" val="53772844"/>
+        <p14:creationId xmlns:p14="http://schemas.microsoft.com/office/powerpoint/2010/main" val="2198373521"/>
       </p:ext>
     </p:extLst>
   </p:cSld>
@@ -10092,7 +10149,7 @@
       </p:grpSpPr>
       <p:pic>
         <p:nvPicPr>
-          <p:cNvPr id="2" name="Picture 1"/>
+          <p:cNvPr id="3" name="Picture 2"/>
           <p:cNvPicPr>
             <a:picLocks noChangeAspect="1"/>
           </p:cNvPicPr>
@@ -10106,8 +10163,8 @@
         </p:blipFill>
         <p:spPr>
           <a:xfrm>
-            <a:off x="217311" y="258233"/>
-            <a:ext cx="8229600" cy="5315656"/>
+            <a:off x="176389" y="177799"/>
+            <a:ext cx="8746496" cy="3801533"/>
           </a:xfrm>
           <a:prstGeom prst="rect">
             <a:avLst/>
@@ -10116,13 +10173,13 @@
       </p:pic>
       <p:sp>
         <p:nvSpPr>
-          <p:cNvPr id="3" name="6-Point Star 2"/>
+          <p:cNvPr id="4" name="6-Point Star 3"/>
           <p:cNvSpPr/>
           <p:nvPr/>
         </p:nvSpPr>
         <p:spPr>
           <a:xfrm>
-            <a:off x="1388532" y="3541888"/>
+            <a:off x="1439332" y="2271888"/>
             <a:ext cx="237067" cy="279400"/>
           </a:xfrm>
           <a:prstGeom prst="star6">
@@ -10155,7 +10212,7 @@
     </p:spTree>
     <p:extLst>
       <p:ext uri="{BB962C8B-B14F-4D97-AF65-F5344CB8AC3E}">
-        <p14:creationId xmlns:p14="http://schemas.microsoft.com/office/powerpoint/2010/main" val="770307594"/>
+        <p14:creationId xmlns:p14="http://schemas.microsoft.com/office/powerpoint/2010/main" val="53772844"/>
       </p:ext>
     </p:extLst>
   </p:cSld>
@@ -10198,8 +10255,8 @@
         </p:blipFill>
         <p:spPr>
           <a:xfrm>
-            <a:off x="103012" y="0"/>
-            <a:ext cx="8942210" cy="4614333"/>
+            <a:off x="217311" y="258233"/>
+            <a:ext cx="8229600" cy="5315656"/>
           </a:xfrm>
           <a:prstGeom prst="rect">
             <a:avLst/>
@@ -10214,7 +10271,7 @@
         </p:nvSpPr>
         <p:spPr>
           <a:xfrm>
-            <a:off x="1227666" y="2935110"/>
+            <a:off x="1388532" y="3541888"/>
             <a:ext cx="237067" cy="279400"/>
           </a:xfrm>
           <a:prstGeom prst="star6">
@@ -10247,20 +10304,13 @@
     </p:spTree>
     <p:extLst>
       <p:ext uri="{BB962C8B-B14F-4D97-AF65-F5344CB8AC3E}">
-        <p14:creationId xmlns:p14="http://schemas.microsoft.com/office/powerpoint/2010/main" val="1043228680"/>
+        <p14:creationId xmlns:p14="http://schemas.microsoft.com/office/powerpoint/2010/main" val="770307594"/>
       </p:ext>
     </p:extLst>
   </p:cSld>
   <p:clrMapOvr>
     <a:masterClrMapping/>
   </p:clrMapOvr>
-  <p:timing>
-    <p:tnLst>
-      <p:par>
-        <p:cTn xmlns:p14="http://schemas.microsoft.com/office/powerpoint/2010/main" id="1" dur="indefinite" restart="never" nodeType="tmRoot"/>
-      </p:par>
-    </p:tnLst>
-  </p:timing>
 </p:sld>
 </file>
 
@@ -10455,18 +10505,56 @@
         </p:blipFill>
         <p:spPr>
           <a:xfrm>
-            <a:off x="0" y="1371600"/>
-            <a:ext cx="9144000" cy="4095648"/>
+            <a:off x="103012" y="0"/>
+            <a:ext cx="8942210" cy="4614333"/>
           </a:xfrm>
           <a:prstGeom prst="rect">
             <a:avLst/>
           </a:prstGeom>
         </p:spPr>
       </p:pic>
+      <p:sp>
+        <p:nvSpPr>
+          <p:cNvPr id="3" name="6-Point Star 2"/>
+          <p:cNvSpPr/>
+          <p:nvPr/>
+        </p:nvSpPr>
+        <p:spPr>
+          <a:xfrm>
+            <a:off x="1227666" y="2935110"/>
+            <a:ext cx="237067" cy="279400"/>
+          </a:xfrm>
+          <a:prstGeom prst="star6">
+            <a:avLst/>
+          </a:prstGeom>
+        </p:spPr>
+        <p:style>
+          <a:lnRef idx="1">
+            <a:schemeClr val="accent1"/>
+          </a:lnRef>
+          <a:fillRef idx="3">
+            <a:schemeClr val="accent1"/>
+          </a:fillRef>
+          <a:effectRef idx="2">
+            <a:schemeClr val="accent1"/>
+          </a:effectRef>
+          <a:fontRef idx="minor">
+            <a:schemeClr val="lt1"/>
+          </a:fontRef>
+        </p:style>
+        <p:txBody>
+          <a:bodyPr rtlCol="0" anchor="ctr"/>
+          <a:lstStyle/>
+          <a:p>
+            <a:pPr algn="ctr"/>
+            <a:endParaRPr lang="en-US"/>
+          </a:p>
+        </p:txBody>
+      </p:sp>
     </p:spTree>
     <p:extLst>
       <p:ext uri="{BB962C8B-B14F-4D97-AF65-F5344CB8AC3E}">
-        <p14:creationId xmlns:p14="http://schemas.microsoft.com/office/powerpoint/2010/main" val="4037830648"/>
+        <p14:creationId xmlns:p14="http://schemas.microsoft.com/office/powerpoint/2010/main" val="1043228680"/>
       </p:ext>
     </p:extLst>
   </p:cSld>
@@ -10516,8 +10604,8 @@
         </p:blipFill>
         <p:spPr>
           <a:xfrm>
-            <a:off x="0" y="1384300"/>
-            <a:ext cx="9144000" cy="4078546"/>
+            <a:off x="0" y="1371600"/>
+            <a:ext cx="9144000" cy="4095648"/>
           </a:xfrm>
           <a:prstGeom prst="rect">
             <a:avLst/>
@@ -10527,7 +10615,7 @@
     </p:spTree>
     <p:extLst>
       <p:ext uri="{BB962C8B-B14F-4D97-AF65-F5344CB8AC3E}">
-        <p14:creationId xmlns:p14="http://schemas.microsoft.com/office/powerpoint/2010/main" val="819535186"/>
+        <p14:creationId xmlns:p14="http://schemas.microsoft.com/office/powerpoint/2010/main" val="4037830648"/>
       </p:ext>
     </p:extLst>
   </p:cSld>
@@ -10577,8 +10665,8 @@
         </p:blipFill>
         <p:spPr>
           <a:xfrm>
-            <a:off x="0" y="825500"/>
-            <a:ext cx="9144000" cy="5196370"/>
+            <a:off x="0" y="1384300"/>
+            <a:ext cx="9144000" cy="4078546"/>
           </a:xfrm>
           <a:prstGeom prst="rect">
             <a:avLst/>
@@ -10588,7 +10676,7 @@
     </p:spTree>
     <p:extLst>
       <p:ext uri="{BB962C8B-B14F-4D97-AF65-F5344CB8AC3E}">
-        <p14:creationId xmlns:p14="http://schemas.microsoft.com/office/powerpoint/2010/main" val="2646928718"/>
+        <p14:creationId xmlns:p14="http://schemas.microsoft.com/office/powerpoint/2010/main" val="819535186"/>
       </p:ext>
     </p:extLst>
   </p:cSld>
@@ -10638,8 +10726,8 @@
         </p:blipFill>
         <p:spPr>
           <a:xfrm>
-            <a:off x="0" y="660400"/>
-            <a:ext cx="9144000" cy="5515265"/>
+            <a:off x="0" y="825500"/>
+            <a:ext cx="9144000" cy="5196370"/>
           </a:xfrm>
           <a:prstGeom prst="rect">
             <a:avLst/>
@@ -10649,7 +10737,7 @@
     </p:spTree>
     <p:extLst>
       <p:ext uri="{BB962C8B-B14F-4D97-AF65-F5344CB8AC3E}">
-        <p14:creationId xmlns:p14="http://schemas.microsoft.com/office/powerpoint/2010/main" val="3323297831"/>
+        <p14:creationId xmlns:p14="http://schemas.microsoft.com/office/powerpoint/2010/main" val="2646928718"/>
       </p:ext>
     </p:extLst>
   </p:cSld>
@@ -10699,8 +10787,8 @@
         </p:blipFill>
         <p:spPr>
           <a:xfrm>
-            <a:off x="0" y="25400"/>
-            <a:ext cx="9144000" cy="6783260"/>
+            <a:off x="0" y="660400"/>
+            <a:ext cx="9144000" cy="5515265"/>
           </a:xfrm>
           <a:prstGeom prst="rect">
             <a:avLst/>
@@ -10710,7 +10798,7 @@
     </p:spTree>
     <p:extLst>
       <p:ext uri="{BB962C8B-B14F-4D97-AF65-F5344CB8AC3E}">
-        <p14:creationId xmlns:p14="http://schemas.microsoft.com/office/powerpoint/2010/main" val="1036975685"/>
+        <p14:creationId xmlns:p14="http://schemas.microsoft.com/office/powerpoint/2010/main" val="3323297831"/>
       </p:ext>
     </p:extLst>
   </p:cSld>
@@ -10760,8 +10848,8 @@
         </p:blipFill>
         <p:spPr>
           <a:xfrm>
-            <a:off x="190500" y="0"/>
-            <a:ext cx="8747226" cy="6858000"/>
+            <a:off x="0" y="25400"/>
+            <a:ext cx="9144000" cy="6783260"/>
           </a:xfrm>
           <a:prstGeom prst="rect">
             <a:avLst/>
@@ -10771,7 +10859,7 @@
     </p:spTree>
     <p:extLst>
       <p:ext uri="{BB962C8B-B14F-4D97-AF65-F5344CB8AC3E}">
-        <p14:creationId xmlns:p14="http://schemas.microsoft.com/office/powerpoint/2010/main" val="382755117"/>
+        <p14:creationId xmlns:p14="http://schemas.microsoft.com/office/powerpoint/2010/main" val="1036975685"/>
       </p:ext>
     </p:extLst>
   </p:cSld>
@@ -10821,8 +10909,8 @@
         </p:blipFill>
         <p:spPr>
           <a:xfrm>
-            <a:off x="635000" y="0"/>
-            <a:ext cx="7859598" cy="6858000"/>
+            <a:off x="190500" y="0"/>
+            <a:ext cx="8747226" cy="6858000"/>
           </a:xfrm>
           <a:prstGeom prst="rect">
             <a:avLst/>
@@ -10832,7 +10920,7 @@
     </p:spTree>
     <p:extLst>
       <p:ext uri="{BB962C8B-B14F-4D97-AF65-F5344CB8AC3E}">
-        <p14:creationId xmlns:p14="http://schemas.microsoft.com/office/powerpoint/2010/main" val="2280381786"/>
+        <p14:creationId xmlns:p14="http://schemas.microsoft.com/office/powerpoint/2010/main" val="382755117"/>
       </p:ext>
     </p:extLst>
   </p:cSld>
@@ -10882,8 +10970,8 @@
         </p:blipFill>
         <p:spPr>
           <a:xfrm>
-            <a:off x="622300" y="0"/>
-            <a:ext cx="7886700" cy="6858000"/>
+            <a:off x="635000" y="0"/>
+            <a:ext cx="7859598" cy="6858000"/>
           </a:xfrm>
           <a:prstGeom prst="rect">
             <a:avLst/>
@@ -10893,7 +10981,7 @@
     </p:spTree>
     <p:extLst>
       <p:ext uri="{BB962C8B-B14F-4D97-AF65-F5344CB8AC3E}">
-        <p14:creationId xmlns:p14="http://schemas.microsoft.com/office/powerpoint/2010/main" val="1009299529"/>
+        <p14:creationId xmlns:p14="http://schemas.microsoft.com/office/powerpoint/2010/main" val="2280381786"/>
       </p:ext>
     </p:extLst>
   </p:cSld>
@@ -10943,8 +11031,8 @@
         </p:blipFill>
         <p:spPr>
           <a:xfrm>
-            <a:off x="0" y="1066800"/>
-            <a:ext cx="9144000" cy="4702954"/>
+            <a:off x="622300" y="0"/>
+            <a:ext cx="7886700" cy="6858000"/>
           </a:xfrm>
           <a:prstGeom prst="rect">
             <a:avLst/>
@@ -10954,7 +11042,7 @@
     </p:spTree>
     <p:extLst>
       <p:ext uri="{BB962C8B-B14F-4D97-AF65-F5344CB8AC3E}">
-        <p14:creationId xmlns:p14="http://schemas.microsoft.com/office/powerpoint/2010/main" val="2384029569"/>
+        <p14:creationId xmlns:p14="http://schemas.microsoft.com/office/powerpoint/2010/main" val="1009299529"/>
       </p:ext>
     </p:extLst>
   </p:cSld>
@@ -11004,8 +11092,8 @@
         </p:blipFill>
         <p:spPr>
           <a:xfrm>
-            <a:off x="0" y="114300"/>
-            <a:ext cx="9144000" cy="6624269"/>
+            <a:off x="0" y="1066800"/>
+            <a:ext cx="9144000" cy="4702954"/>
           </a:xfrm>
           <a:prstGeom prst="rect">
             <a:avLst/>
@@ -11015,7 +11103,7 @@
     </p:spTree>
     <p:extLst>
       <p:ext uri="{BB962C8B-B14F-4D97-AF65-F5344CB8AC3E}">
-        <p14:creationId xmlns:p14="http://schemas.microsoft.com/office/powerpoint/2010/main" val="4265551817"/>
+        <p14:creationId xmlns:p14="http://schemas.microsoft.com/office/powerpoint/2010/main" val="2384029569"/>
       </p:ext>
     </p:extLst>
   </p:cSld>
@@ -11320,56 +11408,18 @@
         </p:blipFill>
         <p:spPr>
           <a:xfrm>
-            <a:off x="460022" y="-1"/>
-            <a:ext cx="8311218" cy="4049889"/>
+            <a:off x="0" y="114300"/>
+            <a:ext cx="9144000" cy="6624269"/>
           </a:xfrm>
           <a:prstGeom prst="rect">
             <a:avLst/>
           </a:prstGeom>
         </p:spPr>
       </p:pic>
-      <p:sp>
-        <p:nvSpPr>
-          <p:cNvPr id="3" name="6-Point Star 2"/>
-          <p:cNvSpPr/>
-          <p:nvPr/>
-        </p:nvSpPr>
-        <p:spPr>
-          <a:xfrm>
-            <a:off x="1707444" y="1679221"/>
-            <a:ext cx="237067" cy="279400"/>
-          </a:xfrm>
-          <a:prstGeom prst="star6">
-            <a:avLst/>
-          </a:prstGeom>
-        </p:spPr>
-        <p:style>
-          <a:lnRef idx="1">
-            <a:schemeClr val="accent1"/>
-          </a:lnRef>
-          <a:fillRef idx="3">
-            <a:schemeClr val="accent1"/>
-          </a:fillRef>
-          <a:effectRef idx="2">
-            <a:schemeClr val="accent1"/>
-          </a:effectRef>
-          <a:fontRef idx="minor">
-            <a:schemeClr val="lt1"/>
-          </a:fontRef>
-        </p:style>
-        <p:txBody>
-          <a:bodyPr rtlCol="0" anchor="ctr"/>
-          <a:lstStyle/>
-          <a:p>
-            <a:pPr algn="ctr"/>
-            <a:endParaRPr lang="en-US"/>
-          </a:p>
-        </p:txBody>
-      </p:sp>
     </p:spTree>
     <p:extLst>
       <p:ext uri="{BB962C8B-B14F-4D97-AF65-F5344CB8AC3E}">
-        <p14:creationId xmlns:p14="http://schemas.microsoft.com/office/powerpoint/2010/main" val="1196013054"/>
+        <p14:creationId xmlns:p14="http://schemas.microsoft.com/office/powerpoint/2010/main" val="4265551817"/>
       </p:ext>
     </p:extLst>
   </p:cSld>
@@ -11419,8 +11469,8 @@
         </p:blipFill>
         <p:spPr>
           <a:xfrm>
-            <a:off x="283632" y="488949"/>
-            <a:ext cx="8732071" cy="3589161"/>
+            <a:off x="460022" y="-1"/>
+            <a:ext cx="8311218" cy="4049889"/>
           </a:xfrm>
           <a:prstGeom prst="rect">
             <a:avLst/>
@@ -11435,7 +11485,7 @@
         </p:nvSpPr>
         <p:spPr>
           <a:xfrm>
-            <a:off x="1470377" y="1044221"/>
+            <a:off x="1707444" y="1679221"/>
             <a:ext cx="237067" cy="279400"/>
           </a:xfrm>
           <a:prstGeom prst="star6">
@@ -11468,7 +11518,7 @@
     </p:spTree>
     <p:extLst>
       <p:ext uri="{BB962C8B-B14F-4D97-AF65-F5344CB8AC3E}">
-        <p14:creationId xmlns:p14="http://schemas.microsoft.com/office/powerpoint/2010/main" val="474734317"/>
+        <p14:creationId xmlns:p14="http://schemas.microsoft.com/office/powerpoint/2010/main" val="1196013054"/>
       </p:ext>
     </p:extLst>
   </p:cSld>
@@ -11518,8 +11568,8 @@
         </p:blipFill>
         <p:spPr>
           <a:xfrm>
-            <a:off x="303388" y="135466"/>
-            <a:ext cx="7627055" cy="5162690"/>
+            <a:off x="283632" y="488949"/>
+            <a:ext cx="8732071" cy="3589161"/>
           </a:xfrm>
           <a:prstGeom prst="rect">
             <a:avLst/>
@@ -11534,7 +11584,7 @@
         </p:nvSpPr>
         <p:spPr>
           <a:xfrm>
-            <a:off x="1456266" y="3005666"/>
+            <a:off x="1470377" y="1044221"/>
             <a:ext cx="237067" cy="279400"/>
           </a:xfrm>
           <a:prstGeom prst="star6">
@@ -11567,7 +11617,7 @@
     </p:spTree>
     <p:extLst>
       <p:ext uri="{BB962C8B-B14F-4D97-AF65-F5344CB8AC3E}">
-        <p14:creationId xmlns:p14="http://schemas.microsoft.com/office/powerpoint/2010/main" val="3178231977"/>
+        <p14:creationId xmlns:p14="http://schemas.microsoft.com/office/powerpoint/2010/main" val="474734317"/>
       </p:ext>
     </p:extLst>
   </p:cSld>
@@ -11617,8 +11667,8 @@
         </p:blipFill>
         <p:spPr>
           <a:xfrm>
-            <a:off x="263877" y="258233"/>
-            <a:ext cx="8484691" cy="4073877"/>
+            <a:off x="303388" y="135466"/>
+            <a:ext cx="7627055" cy="5162690"/>
           </a:xfrm>
           <a:prstGeom prst="rect">
             <a:avLst/>
@@ -11633,7 +11683,7 @@
         </p:nvSpPr>
         <p:spPr>
           <a:xfrm>
-            <a:off x="1337732" y="1735666"/>
+            <a:off x="1456266" y="3005666"/>
             <a:ext cx="237067" cy="279400"/>
           </a:xfrm>
           <a:prstGeom prst="star6">
@@ -11666,13 +11716,20 @@
     </p:spTree>
     <p:extLst>
       <p:ext uri="{BB962C8B-B14F-4D97-AF65-F5344CB8AC3E}">
-        <p14:creationId xmlns:p14="http://schemas.microsoft.com/office/powerpoint/2010/main" val="135507164"/>
+        <p14:creationId xmlns:p14="http://schemas.microsoft.com/office/powerpoint/2010/main" val="3178231977"/>
       </p:ext>
     </p:extLst>
   </p:cSld>
   <p:clrMapOvr>
     <a:masterClrMapping/>
   </p:clrMapOvr>
+  <p:timing>
+    <p:tnLst>
+      <p:par>
+        <p:cTn xmlns:p14="http://schemas.microsoft.com/office/powerpoint/2010/main" id="1" dur="indefinite" restart="never" nodeType="tmRoot"/>
+      </p:par>
+    </p:tnLst>
+  </p:timing>
 </p:sld>
 </file>
 
@@ -11709,8 +11766,8 @@
         </p:blipFill>
         <p:spPr>
           <a:xfrm>
-            <a:off x="393700" y="198965"/>
-            <a:ext cx="8327114" cy="3526367"/>
+            <a:off x="263877" y="258233"/>
+            <a:ext cx="8484691" cy="4073877"/>
           </a:xfrm>
           <a:prstGeom prst="rect">
             <a:avLst/>
@@ -11725,7 +11782,7 @@
         </p:nvSpPr>
         <p:spPr>
           <a:xfrm>
-            <a:off x="1566331" y="818445"/>
+            <a:off x="1337732" y="1735666"/>
             <a:ext cx="237067" cy="279400"/>
           </a:xfrm>
           <a:prstGeom prst="star6">
@@ -11758,7 +11815,7 @@
     </p:spTree>
     <p:extLst>
       <p:ext uri="{BB962C8B-B14F-4D97-AF65-F5344CB8AC3E}">
-        <p14:creationId xmlns:p14="http://schemas.microsoft.com/office/powerpoint/2010/main" val="737954175"/>
+        <p14:creationId xmlns:p14="http://schemas.microsoft.com/office/powerpoint/2010/main" val="135507164"/>
       </p:ext>
     </p:extLst>
   </p:cSld>
@@ -11801,18 +11858,56 @@
         </p:blipFill>
         <p:spPr>
           <a:xfrm>
-            <a:off x="252588" y="98777"/>
-            <a:ext cx="8862835" cy="4106333"/>
+            <a:off x="393700" y="198965"/>
+            <a:ext cx="8327114" cy="3526367"/>
           </a:xfrm>
           <a:prstGeom prst="rect">
             <a:avLst/>
           </a:prstGeom>
         </p:spPr>
       </p:pic>
+      <p:sp>
+        <p:nvSpPr>
+          <p:cNvPr id="3" name="6-Point Star 2"/>
+          <p:cNvSpPr/>
+          <p:nvPr/>
+        </p:nvSpPr>
+        <p:spPr>
+          <a:xfrm>
+            <a:off x="1566331" y="818445"/>
+            <a:ext cx="237067" cy="279400"/>
+          </a:xfrm>
+          <a:prstGeom prst="star6">
+            <a:avLst/>
+          </a:prstGeom>
+        </p:spPr>
+        <p:style>
+          <a:lnRef idx="1">
+            <a:schemeClr val="accent1"/>
+          </a:lnRef>
+          <a:fillRef idx="3">
+            <a:schemeClr val="accent1"/>
+          </a:fillRef>
+          <a:effectRef idx="2">
+            <a:schemeClr val="accent1"/>
+          </a:effectRef>
+          <a:fontRef idx="minor">
+            <a:schemeClr val="lt1"/>
+          </a:fontRef>
+        </p:style>
+        <p:txBody>
+          <a:bodyPr rtlCol="0" anchor="ctr"/>
+          <a:lstStyle/>
+          <a:p>
+            <a:pPr algn="ctr"/>
+            <a:endParaRPr lang="en-US"/>
+          </a:p>
+        </p:txBody>
+      </p:sp>
     </p:spTree>
     <p:extLst>
       <p:ext uri="{BB962C8B-B14F-4D97-AF65-F5344CB8AC3E}">
-        <p14:creationId xmlns:p14="http://schemas.microsoft.com/office/powerpoint/2010/main" val="1895318106"/>
+        <p14:creationId xmlns:p14="http://schemas.microsoft.com/office/powerpoint/2010/main" val="737954175"/>
       </p:ext>
     </p:extLst>
   </p:cSld>
@@ -11855,56 +11950,18 @@
         </p:blipFill>
         <p:spPr>
           <a:xfrm>
-            <a:off x="160866" y="193321"/>
-            <a:ext cx="8957204" cy="3447345"/>
+            <a:off x="252588" y="98777"/>
+            <a:ext cx="8862835" cy="4106333"/>
           </a:xfrm>
           <a:prstGeom prst="rect">
             <a:avLst/>
           </a:prstGeom>
         </p:spPr>
       </p:pic>
-      <p:sp>
-        <p:nvSpPr>
-          <p:cNvPr id="3" name="6-Point Star 2"/>
-          <p:cNvSpPr/>
-          <p:nvPr/>
-        </p:nvSpPr>
-        <p:spPr>
-          <a:xfrm>
-            <a:off x="1168399" y="2779888"/>
-            <a:ext cx="237067" cy="279400"/>
-          </a:xfrm>
-          <a:prstGeom prst="star6">
-            <a:avLst/>
-          </a:prstGeom>
-        </p:spPr>
-        <p:style>
-          <a:lnRef idx="1">
-            <a:schemeClr val="accent1"/>
-          </a:lnRef>
-          <a:fillRef idx="3">
-            <a:schemeClr val="accent1"/>
-          </a:fillRef>
-          <a:effectRef idx="2">
-            <a:schemeClr val="accent1"/>
-          </a:effectRef>
-          <a:fontRef idx="minor">
-            <a:schemeClr val="lt1"/>
-          </a:fontRef>
-        </p:style>
-        <p:txBody>
-          <a:bodyPr rtlCol="0" anchor="ctr"/>
-          <a:lstStyle/>
-          <a:p>
-            <a:pPr algn="ctr"/>
-            <a:endParaRPr lang="en-US"/>
-          </a:p>
-        </p:txBody>
-      </p:sp>
     </p:spTree>
     <p:extLst>
       <p:ext uri="{BB962C8B-B14F-4D97-AF65-F5344CB8AC3E}">
-        <p14:creationId xmlns:p14="http://schemas.microsoft.com/office/powerpoint/2010/main" val="697898071"/>
+        <p14:creationId xmlns:p14="http://schemas.microsoft.com/office/powerpoint/2010/main" val="1895318106"/>
       </p:ext>
     </p:extLst>
   </p:cSld>
@@ -11947,8 +12004,8 @@
         </p:blipFill>
         <p:spPr>
           <a:xfrm>
-            <a:off x="231422" y="235654"/>
-            <a:ext cx="8890197" cy="2967567"/>
+            <a:off x="160866" y="193321"/>
+            <a:ext cx="8957204" cy="3447345"/>
           </a:xfrm>
           <a:prstGeom prst="rect">
             <a:avLst/>
@@ -11963,7 +12020,7 @@
         </p:nvSpPr>
         <p:spPr>
           <a:xfrm>
-            <a:off x="1224844" y="776111"/>
+            <a:off x="1168399" y="2779888"/>
             <a:ext cx="237067" cy="279400"/>
           </a:xfrm>
           <a:prstGeom prst="star6">
@@ -11996,7 +12053,7 @@
     </p:spTree>
     <p:extLst>
       <p:ext uri="{BB962C8B-B14F-4D97-AF65-F5344CB8AC3E}">
-        <p14:creationId xmlns:p14="http://schemas.microsoft.com/office/powerpoint/2010/main" val="2314667283"/>
+        <p14:creationId xmlns:p14="http://schemas.microsoft.com/office/powerpoint/2010/main" val="697898071"/>
       </p:ext>
     </p:extLst>
   </p:cSld>
@@ -12039,8 +12096,8 @@
         </p:blipFill>
         <p:spPr>
           <a:xfrm>
-            <a:off x="345722" y="299154"/>
-            <a:ext cx="8584522" cy="4879623"/>
+            <a:off x="231422" y="235654"/>
+            <a:ext cx="8890197" cy="2967567"/>
           </a:xfrm>
           <a:prstGeom prst="rect">
             <a:avLst/>
@@ -12055,7 +12112,7 @@
         </p:nvSpPr>
         <p:spPr>
           <a:xfrm>
-            <a:off x="1380066" y="4388555"/>
+            <a:off x="1224844" y="776111"/>
             <a:ext cx="237067" cy="279400"/>
           </a:xfrm>
           <a:prstGeom prst="star6">
@@ -12088,7 +12145,7 @@
     </p:spTree>
     <p:extLst>
       <p:ext uri="{BB962C8B-B14F-4D97-AF65-F5344CB8AC3E}">
-        <p14:creationId xmlns:p14="http://schemas.microsoft.com/office/powerpoint/2010/main" val="482751204"/>
+        <p14:creationId xmlns:p14="http://schemas.microsoft.com/office/powerpoint/2010/main" val="2314667283"/>
       </p:ext>
     </p:extLst>
   </p:cSld>
@@ -12131,8 +12188,8 @@
         </p:blipFill>
         <p:spPr>
           <a:xfrm>
-            <a:off x="232833" y="201789"/>
-            <a:ext cx="8827722" cy="3975100"/>
+            <a:off x="345722" y="299154"/>
+            <a:ext cx="8584522" cy="4879623"/>
           </a:xfrm>
           <a:prstGeom prst="rect">
             <a:avLst/>
@@ -12147,7 +12204,7 @@
         </p:nvSpPr>
         <p:spPr>
           <a:xfrm>
-            <a:off x="1380066" y="4402666"/>
+            <a:off x="1380066" y="4388555"/>
             <a:ext cx="237067" cy="279400"/>
           </a:xfrm>
           <a:prstGeom prst="star6">
@@ -12180,7 +12237,7 @@
     </p:spTree>
     <p:extLst>
       <p:ext uri="{BB962C8B-B14F-4D97-AF65-F5344CB8AC3E}">
-        <p14:creationId xmlns:p14="http://schemas.microsoft.com/office/powerpoint/2010/main" val="609491269"/>
+        <p14:creationId xmlns:p14="http://schemas.microsoft.com/office/powerpoint/2010/main" val="482751204"/>
       </p:ext>
     </p:extLst>
   </p:cSld>
@@ -12321,8 +12378,8 @@
         </p:blipFill>
         <p:spPr>
           <a:xfrm>
-            <a:off x="238478" y="279399"/>
-            <a:ext cx="8411224" cy="3982157"/>
+            <a:off x="232833" y="201789"/>
+            <a:ext cx="8827722" cy="3975100"/>
           </a:xfrm>
           <a:prstGeom prst="rect">
             <a:avLst/>
@@ -12337,7 +12394,7 @@
         </p:nvSpPr>
         <p:spPr>
           <a:xfrm>
-            <a:off x="1142998" y="2088444"/>
+            <a:off x="1380066" y="4402666"/>
             <a:ext cx="237067" cy="279400"/>
           </a:xfrm>
           <a:prstGeom prst="star6">
@@ -12370,7 +12427,7 @@
     </p:spTree>
     <p:extLst>
       <p:ext uri="{BB962C8B-B14F-4D97-AF65-F5344CB8AC3E}">
-        <p14:creationId xmlns:p14="http://schemas.microsoft.com/office/powerpoint/2010/main" val="489549149"/>
+        <p14:creationId xmlns:p14="http://schemas.microsoft.com/office/powerpoint/2010/main" val="609491269"/>
       </p:ext>
     </p:extLst>
   </p:cSld>
@@ -12413,18 +12470,56 @@
         </p:blipFill>
         <p:spPr>
           <a:xfrm>
-            <a:off x="211666" y="155221"/>
-            <a:ext cx="8809356" cy="2723445"/>
+            <a:off x="238478" y="279399"/>
+            <a:ext cx="8411224" cy="3982157"/>
           </a:xfrm>
           <a:prstGeom prst="rect">
             <a:avLst/>
           </a:prstGeom>
         </p:spPr>
       </p:pic>
+      <p:sp>
+        <p:nvSpPr>
+          <p:cNvPr id="3" name="6-Point Star 2"/>
+          <p:cNvSpPr/>
+          <p:nvPr/>
+        </p:nvSpPr>
+        <p:spPr>
+          <a:xfrm>
+            <a:off x="1142998" y="2088444"/>
+            <a:ext cx="237067" cy="279400"/>
+          </a:xfrm>
+          <a:prstGeom prst="star6">
+            <a:avLst/>
+          </a:prstGeom>
+        </p:spPr>
+        <p:style>
+          <a:lnRef idx="1">
+            <a:schemeClr val="accent1"/>
+          </a:lnRef>
+          <a:fillRef idx="3">
+            <a:schemeClr val="accent1"/>
+          </a:fillRef>
+          <a:effectRef idx="2">
+            <a:schemeClr val="accent1"/>
+          </a:effectRef>
+          <a:fontRef idx="minor">
+            <a:schemeClr val="lt1"/>
+          </a:fontRef>
+        </p:style>
+        <p:txBody>
+          <a:bodyPr rtlCol="0" anchor="ctr"/>
+          <a:lstStyle/>
+          <a:p>
+            <a:pPr algn="ctr"/>
+            <a:endParaRPr lang="en-US"/>
+          </a:p>
+        </p:txBody>
+      </p:sp>
     </p:spTree>
     <p:extLst>
       <p:ext uri="{BB962C8B-B14F-4D97-AF65-F5344CB8AC3E}">
-        <p14:creationId xmlns:p14="http://schemas.microsoft.com/office/powerpoint/2010/main" val="2311281385"/>
+        <p14:creationId xmlns:p14="http://schemas.microsoft.com/office/powerpoint/2010/main" val="489549149"/>
       </p:ext>
     </p:extLst>
   </p:cSld>
@@ -12467,56 +12562,18 @@
         </p:blipFill>
         <p:spPr>
           <a:xfrm>
-            <a:off x="110066" y="88899"/>
-            <a:ext cx="9042979" cy="2747433"/>
+            <a:off x="211666" y="155221"/>
+            <a:ext cx="8809356" cy="2723445"/>
           </a:xfrm>
           <a:prstGeom prst="rect">
             <a:avLst/>
           </a:prstGeom>
         </p:spPr>
       </p:pic>
-      <p:sp>
-        <p:nvSpPr>
-          <p:cNvPr id="3" name="6-Point Star 2"/>
-          <p:cNvSpPr/>
-          <p:nvPr/>
-        </p:nvSpPr>
-        <p:spPr>
-          <a:xfrm>
-            <a:off x="1261532" y="1086555"/>
-            <a:ext cx="237067" cy="279400"/>
-          </a:xfrm>
-          <a:prstGeom prst="star6">
-            <a:avLst/>
-          </a:prstGeom>
-        </p:spPr>
-        <p:style>
-          <a:lnRef idx="1">
-            <a:schemeClr val="accent1"/>
-          </a:lnRef>
-          <a:fillRef idx="3">
-            <a:schemeClr val="accent1"/>
-          </a:fillRef>
-          <a:effectRef idx="2">
-            <a:schemeClr val="accent1"/>
-          </a:effectRef>
-          <a:fontRef idx="minor">
-            <a:schemeClr val="lt1"/>
-          </a:fontRef>
-        </p:style>
-        <p:txBody>
-          <a:bodyPr rtlCol="0" anchor="ctr"/>
-          <a:lstStyle/>
-          <a:p>
-            <a:pPr algn="ctr"/>
-            <a:endParaRPr lang="en-US"/>
-          </a:p>
-        </p:txBody>
-      </p:sp>
     </p:spTree>
     <p:extLst>
       <p:ext uri="{BB962C8B-B14F-4D97-AF65-F5344CB8AC3E}">
-        <p14:creationId xmlns:p14="http://schemas.microsoft.com/office/powerpoint/2010/main" val="942956628"/>
+        <p14:creationId xmlns:p14="http://schemas.microsoft.com/office/powerpoint/2010/main" val="2311281385"/>
       </p:ext>
     </p:extLst>
   </p:cSld>
@@ -12559,8 +12616,8 @@
         </p:blipFill>
         <p:spPr>
           <a:xfrm>
-            <a:off x="150988" y="294921"/>
-            <a:ext cx="8414950" cy="3021189"/>
+            <a:off x="110066" y="88899"/>
+            <a:ext cx="9042979" cy="2747433"/>
           </a:xfrm>
           <a:prstGeom prst="rect">
             <a:avLst/>
@@ -12575,7 +12632,7 @@
         </p:nvSpPr>
         <p:spPr>
           <a:xfrm>
-            <a:off x="1380066" y="1425221"/>
+            <a:off x="1261532" y="1086555"/>
             <a:ext cx="237067" cy="279400"/>
           </a:xfrm>
           <a:prstGeom prst="star6">
@@ -12608,7 +12665,7 @@
     </p:spTree>
     <p:extLst>
       <p:ext uri="{BB962C8B-B14F-4D97-AF65-F5344CB8AC3E}">
-        <p14:creationId xmlns:p14="http://schemas.microsoft.com/office/powerpoint/2010/main" val="2810833706"/>
+        <p14:creationId xmlns:p14="http://schemas.microsoft.com/office/powerpoint/2010/main" val="942956628"/>
       </p:ext>
     </p:extLst>
   </p:cSld>
@@ -12651,8 +12708,8 @@
         </p:blipFill>
         <p:spPr>
           <a:xfrm>
-            <a:off x="117122" y="50800"/>
-            <a:ext cx="8848415" cy="2672644"/>
+            <a:off x="150988" y="294921"/>
+            <a:ext cx="8414950" cy="3021189"/>
           </a:xfrm>
           <a:prstGeom prst="rect">
             <a:avLst/>
@@ -12667,7 +12724,7 @@
         </p:nvSpPr>
         <p:spPr>
           <a:xfrm>
-            <a:off x="1142999" y="2328333"/>
+            <a:off x="1380066" y="1425221"/>
             <a:ext cx="237067" cy="279400"/>
           </a:xfrm>
           <a:prstGeom prst="star6">
@@ -12700,7 +12757,7 @@
     </p:spTree>
     <p:extLst>
       <p:ext uri="{BB962C8B-B14F-4D97-AF65-F5344CB8AC3E}">
-        <p14:creationId xmlns:p14="http://schemas.microsoft.com/office/powerpoint/2010/main" val="1956756339"/>
+        <p14:creationId xmlns:p14="http://schemas.microsoft.com/office/powerpoint/2010/main" val="2810833706"/>
       </p:ext>
     </p:extLst>
   </p:cSld>
@@ -12743,8 +12800,8 @@
         </p:blipFill>
         <p:spPr>
           <a:xfrm>
-            <a:off x="103011" y="143932"/>
-            <a:ext cx="8968716" cy="3976512"/>
+            <a:off x="117122" y="50800"/>
+            <a:ext cx="8848415" cy="2672644"/>
           </a:xfrm>
           <a:prstGeom prst="rect">
             <a:avLst/>
@@ -12759,7 +12816,7 @@
         </p:nvSpPr>
         <p:spPr>
           <a:xfrm>
-            <a:off x="1083733" y="2892777"/>
+            <a:off x="1142999" y="2328333"/>
             <a:ext cx="237067" cy="279400"/>
           </a:xfrm>
           <a:prstGeom prst="star6">
@@ -12792,7 +12849,7 @@
     </p:spTree>
     <p:extLst>
       <p:ext uri="{BB962C8B-B14F-4D97-AF65-F5344CB8AC3E}">
-        <p14:creationId xmlns:p14="http://schemas.microsoft.com/office/powerpoint/2010/main" val="1531214714"/>
+        <p14:creationId xmlns:p14="http://schemas.microsoft.com/office/powerpoint/2010/main" val="1956756339"/>
       </p:ext>
     </p:extLst>
   </p:cSld>
@@ -12835,8 +12892,8 @@
         </p:blipFill>
         <p:spPr>
           <a:xfrm>
-            <a:off x="547510" y="290688"/>
-            <a:ext cx="7955253" cy="3138311"/>
+            <a:off x="103011" y="143932"/>
+            <a:ext cx="8968716" cy="3976512"/>
           </a:xfrm>
           <a:prstGeom prst="rect">
             <a:avLst/>
@@ -12851,7 +12908,7 @@
         </p:nvSpPr>
         <p:spPr>
           <a:xfrm>
-            <a:off x="1873955" y="2511777"/>
+            <a:off x="1083733" y="2892777"/>
             <a:ext cx="237067" cy="279400"/>
           </a:xfrm>
           <a:prstGeom prst="star6">
@@ -12884,7 +12941,7 @@
     </p:spTree>
     <p:extLst>
       <p:ext uri="{BB962C8B-B14F-4D97-AF65-F5344CB8AC3E}">
-        <p14:creationId xmlns:p14="http://schemas.microsoft.com/office/powerpoint/2010/main" val="620407203"/>
+        <p14:creationId xmlns:p14="http://schemas.microsoft.com/office/powerpoint/2010/main" val="1531214714"/>
       </p:ext>
     </p:extLst>
   </p:cSld>
@@ -12927,18 +12984,56 @@
         </p:blipFill>
         <p:spPr>
           <a:xfrm>
-            <a:off x="649111" y="145443"/>
-            <a:ext cx="6166556" cy="6447605"/>
+            <a:off x="547510" y="290688"/>
+            <a:ext cx="7955253" cy="3138311"/>
           </a:xfrm>
           <a:prstGeom prst="rect">
             <a:avLst/>
           </a:prstGeom>
         </p:spPr>
       </p:pic>
+      <p:sp>
+        <p:nvSpPr>
+          <p:cNvPr id="3" name="6-Point Star 2"/>
+          <p:cNvSpPr/>
+          <p:nvPr/>
+        </p:nvSpPr>
+        <p:spPr>
+          <a:xfrm>
+            <a:off x="1873955" y="2511777"/>
+            <a:ext cx="237067" cy="279400"/>
+          </a:xfrm>
+          <a:prstGeom prst="star6">
+            <a:avLst/>
+          </a:prstGeom>
+        </p:spPr>
+        <p:style>
+          <a:lnRef idx="1">
+            <a:schemeClr val="accent1"/>
+          </a:lnRef>
+          <a:fillRef idx="3">
+            <a:schemeClr val="accent1"/>
+          </a:fillRef>
+          <a:effectRef idx="2">
+            <a:schemeClr val="accent1"/>
+          </a:effectRef>
+          <a:fontRef idx="minor">
+            <a:schemeClr val="lt1"/>
+          </a:fontRef>
+        </p:style>
+        <p:txBody>
+          <a:bodyPr rtlCol="0" anchor="ctr"/>
+          <a:lstStyle/>
+          <a:p>
+            <a:pPr algn="ctr"/>
+            <a:endParaRPr lang="en-US"/>
+          </a:p>
+        </p:txBody>
+      </p:sp>
     </p:spTree>
     <p:extLst>
       <p:ext uri="{BB962C8B-B14F-4D97-AF65-F5344CB8AC3E}">
-        <p14:creationId xmlns:p14="http://schemas.microsoft.com/office/powerpoint/2010/main" val="3407884281"/>
+        <p14:creationId xmlns:p14="http://schemas.microsoft.com/office/powerpoint/2010/main" val="620407203"/>
       </p:ext>
     </p:extLst>
   </p:cSld>
@@ -12981,8 +13076,8 @@
         </p:blipFill>
         <p:spPr>
           <a:xfrm>
-            <a:off x="240853" y="423333"/>
-            <a:ext cx="7277547" cy="5050367"/>
+            <a:off x="649111" y="145443"/>
+            <a:ext cx="6166556" cy="6447605"/>
           </a:xfrm>
           <a:prstGeom prst="rect">
             <a:avLst/>
@@ -12992,7 +13087,7 @@
     </p:spTree>
     <p:extLst>
       <p:ext uri="{BB962C8B-B14F-4D97-AF65-F5344CB8AC3E}">
-        <p14:creationId xmlns:p14="http://schemas.microsoft.com/office/powerpoint/2010/main" val="2771193522"/>
+        <p14:creationId xmlns:p14="http://schemas.microsoft.com/office/powerpoint/2010/main" val="3407884281"/>
       </p:ext>
     </p:extLst>
   </p:cSld>
@@ -13035,8 +13130,8 @@
         </p:blipFill>
         <p:spPr>
           <a:xfrm>
-            <a:off x="1636889" y="105638"/>
-            <a:ext cx="5132211" cy="5812562"/>
+            <a:off x="240853" y="423333"/>
+            <a:ext cx="7277547" cy="5050367"/>
           </a:xfrm>
           <a:prstGeom prst="rect">
             <a:avLst/>
@@ -13046,7 +13141,7 @@
     </p:spTree>
     <p:extLst>
       <p:ext uri="{BB962C8B-B14F-4D97-AF65-F5344CB8AC3E}">
-        <p14:creationId xmlns:p14="http://schemas.microsoft.com/office/powerpoint/2010/main" val="41950219"/>
+        <p14:creationId xmlns:p14="http://schemas.microsoft.com/office/powerpoint/2010/main" val="2771193522"/>
       </p:ext>
     </p:extLst>
   </p:cSld>

</xml_diff>